<commit_message>
Added a few items to the presentation.
</commit_message>
<xml_diff>
--- a/report/JET Audio Encoder.pptx
+++ b/report/JET Audio Encoder.pptx
@@ -740,7 +740,7 @@
           <a:p>
             <a:fld id="{0687A9EE-9FDB-45A0-9CB2-30AFE7A6E960}" type="datetimeFigureOut">
               <a:rPr lang="en-US" smtClean="0"/>
-              <a:t>5/2/2017</a:t>
+              <a:t>5/3/2017</a:t>
             </a:fld>
             <a:endParaRPr lang="en-US"/>
           </a:p>
@@ -936,7 +936,7 @@
           <a:p>
             <a:fld id="{0687A9EE-9FDB-45A0-9CB2-30AFE7A6E960}" type="datetimeFigureOut">
               <a:rPr lang="en-US" smtClean="0"/>
-              <a:t>5/2/2017</a:t>
+              <a:t>5/3/2017</a:t>
             </a:fld>
             <a:endParaRPr lang="en-US"/>
           </a:p>
@@ -1121,7 +1121,7 @@
           <a:p>
             <a:fld id="{0687A9EE-9FDB-45A0-9CB2-30AFE7A6E960}" type="datetimeFigureOut">
               <a:rPr lang="en-US" smtClean="0"/>
-              <a:t>5/2/2017</a:t>
+              <a:t>5/3/2017</a:t>
             </a:fld>
             <a:endParaRPr lang="en-US"/>
           </a:p>
@@ -1271,7 +1271,7 @@
           <a:p>
             <a:fld id="{0687A9EE-9FDB-45A0-9CB2-30AFE7A6E960}" type="datetimeFigureOut">
               <a:rPr lang="en-US" smtClean="0"/>
-              <a:t>5/2/2017</a:t>
+              <a:t>5/3/2017</a:t>
             </a:fld>
             <a:endParaRPr lang="en-US"/>
           </a:p>
@@ -1526,7 +1526,7 @@
           <a:p>
             <a:fld id="{0687A9EE-9FDB-45A0-9CB2-30AFE7A6E960}" type="datetimeFigureOut">
               <a:rPr lang="en-US" smtClean="0"/>
-              <a:t>5/2/2017</a:t>
+              <a:t>5/3/2017</a:t>
             </a:fld>
             <a:endParaRPr lang="en-US"/>
           </a:p>
@@ -1935,7 +1935,7 @@
           <a:p>
             <a:fld id="{0687A9EE-9FDB-45A0-9CB2-30AFE7A6E960}" type="datetimeFigureOut">
               <a:rPr lang="en-US" smtClean="0"/>
-              <a:t>5/2/2017</a:t>
+              <a:t>5/3/2017</a:t>
             </a:fld>
             <a:endParaRPr lang="en-US"/>
           </a:p>
@@ -2381,7 +2381,7 @@
           <a:p>
             <a:fld id="{0687A9EE-9FDB-45A0-9CB2-30AFE7A6E960}" type="datetimeFigureOut">
               <a:rPr lang="en-US" smtClean="0"/>
-              <a:t>5/2/2017</a:t>
+              <a:t>5/3/2017</a:t>
             </a:fld>
             <a:endParaRPr lang="en-US"/>
           </a:p>
@@ -2482,7 +2482,7 @@
           <a:p>
             <a:fld id="{0687A9EE-9FDB-45A0-9CB2-30AFE7A6E960}" type="datetimeFigureOut">
               <a:rPr lang="en-US" smtClean="0"/>
-              <a:t>5/2/2017</a:t>
+              <a:t>5/3/2017</a:t>
             </a:fld>
             <a:endParaRPr lang="en-US"/>
           </a:p>
@@ -2603,7 +2603,7 @@
           <a:p>
             <a:fld id="{0687A9EE-9FDB-45A0-9CB2-30AFE7A6E960}" type="datetimeFigureOut">
               <a:rPr lang="en-US" smtClean="0"/>
-              <a:t>5/2/2017</a:t>
+              <a:t>5/3/2017</a:t>
             </a:fld>
             <a:endParaRPr lang="en-US"/>
           </a:p>
@@ -2877,7 +2877,7 @@
           <a:p>
             <a:fld id="{0687A9EE-9FDB-45A0-9CB2-30AFE7A6E960}" type="datetimeFigureOut">
               <a:rPr lang="en-US" smtClean="0"/>
-              <a:t>5/2/2017</a:t>
+              <a:t>5/3/2017</a:t>
             </a:fld>
             <a:endParaRPr lang="en-US"/>
           </a:p>
@@ -3082,7 +3082,7 @@
           <a:p>
             <a:fld id="{0687A9EE-9FDB-45A0-9CB2-30AFE7A6E960}" type="datetimeFigureOut">
               <a:rPr lang="en-US" smtClean="0"/>
-              <a:t>5/2/2017</a:t>
+              <a:t>5/3/2017</a:t>
             </a:fld>
             <a:endParaRPr lang="en-US"/>
           </a:p>
@@ -4191,7 +4191,7 @@
           <a:p>
             <a:fld id="{0687A9EE-9FDB-45A0-9CB2-30AFE7A6E960}" type="datetimeFigureOut">
               <a:rPr lang="en-US" smtClean="0"/>
-              <a:t>5/2/2017</a:t>
+              <a:t>5/3/2017</a:t>
             </a:fld>
             <a:endParaRPr lang="en-US"/>
           </a:p>
@@ -4847,7 +4847,7 @@
         </p:nvSpPr>
         <p:spPr>
           <a:xfrm>
-            <a:off x="5638800" y="2105114"/>
+            <a:off x="5105400" y="2625887"/>
             <a:ext cx="1676400" cy="307777"/>
           </a:xfrm>
           <a:prstGeom prst="rect">
@@ -4893,8 +4893,8 @@
         </p:nvSpPr>
         <p:spPr>
           <a:xfrm>
-            <a:off x="5372100" y="1425723"/>
-            <a:ext cx="2209800" cy="307777"/>
+            <a:off x="4886325" y="1673423"/>
+            <a:ext cx="2114550" cy="307777"/>
           </a:xfrm>
           <a:prstGeom prst="rect">
             <a:avLst/>
@@ -4937,7 +4937,7 @@
         </p:nvSpPr>
         <p:spPr>
           <a:xfrm>
-            <a:off x="2057400" y="1894719"/>
+            <a:off x="2324456" y="2410444"/>
             <a:ext cx="2286000" cy="738664"/>
           </a:xfrm>
           <a:prstGeom prst="rect">
@@ -4980,7 +4980,7 @@
         </p:nvSpPr>
         <p:spPr>
           <a:xfrm>
-            <a:off x="5715000" y="3476654"/>
+            <a:off x="4876800" y="3584375"/>
             <a:ext cx="2133600" cy="523220"/>
           </a:xfrm>
           <a:prstGeom prst="rect">
@@ -5028,7 +5028,7 @@
         </p:nvSpPr>
         <p:spPr>
           <a:xfrm>
-            <a:off x="1524000" y="3584376"/>
+            <a:off x="2514956" y="3692097"/>
             <a:ext cx="1905000" cy="307777"/>
           </a:xfrm>
           <a:prstGeom prst="rect">
@@ -5058,11 +5058,7 @@
             <a:pPr algn="ctr"/>
             <a:r>
               <a:rPr lang="en-US" sz="1400" dirty="0" smtClean="0"/>
-              <a:t>Line </a:t>
-            </a:r>
-            <a:r>
-              <a:rPr lang="en-US" sz="1400" dirty="0" smtClean="0"/>
-              <a:t>Byte </a:t>
+              <a:t>Line Byte </a:t>
             </a:r>
             <a:r>
               <a:rPr lang="en-US" sz="1400" dirty="0" err="1" smtClean="0"/>
@@ -5169,8 +5165,8 @@
         </p:nvCxnSpPr>
         <p:spPr>
           <a:xfrm flipH="1">
-            <a:off x="4343400" y="2259003"/>
-            <a:ext cx="1295400" cy="5048"/>
+            <a:off x="4610456" y="2779776"/>
+            <a:ext cx="494944" cy="0"/>
           </a:xfrm>
           <a:prstGeom prst="straightConnector1">
             <a:avLst/>
@@ -5206,8 +5202,8 @@
         </p:nvCxnSpPr>
         <p:spPr>
           <a:xfrm>
-            <a:off x="6477000" y="1733500"/>
-            <a:ext cx="0" cy="371614"/>
+            <a:off x="5943600" y="1981200"/>
+            <a:ext cx="0" cy="644687"/>
           </a:xfrm>
           <a:prstGeom prst="straightConnector1">
             <a:avLst/>
@@ -5242,9 +5238,9 @@
           <p:nvPr/>
         </p:nvCxnSpPr>
         <p:spPr>
-          <a:xfrm flipH="1">
-            <a:off x="2476500" y="2633383"/>
-            <a:ext cx="723900" cy="950993"/>
+          <a:xfrm>
+            <a:off x="3467456" y="3149108"/>
+            <a:ext cx="0" cy="542989"/>
           </a:xfrm>
           <a:prstGeom prst="straightConnector1">
             <a:avLst/>
@@ -5280,8 +5276,8 @@
         </p:nvCxnSpPr>
         <p:spPr>
           <a:xfrm>
-            <a:off x="6477000" y="2412891"/>
-            <a:ext cx="304800" cy="1063763"/>
+            <a:off x="5943600" y="2933664"/>
+            <a:ext cx="0" cy="650711"/>
           </a:xfrm>
           <a:prstGeom prst="straightConnector1">
             <a:avLst/>
@@ -5317,8 +5313,8 @@
         </p:nvCxnSpPr>
         <p:spPr>
           <a:xfrm>
-            <a:off x="2476500" y="3892153"/>
-            <a:ext cx="2133600" cy="756047"/>
+            <a:off x="3467456" y="3999874"/>
+            <a:ext cx="1142644" cy="648326"/>
           </a:xfrm>
           <a:prstGeom prst="straightConnector1">
             <a:avLst/>
@@ -5354,8 +5350,8 @@
         </p:nvCxnSpPr>
         <p:spPr>
           <a:xfrm flipH="1">
-            <a:off x="4610100" y="3999874"/>
-            <a:ext cx="2171700" cy="648326"/>
+            <a:off x="4610100" y="4107595"/>
+            <a:ext cx="1333500" cy="540605"/>
           </a:xfrm>
           <a:prstGeom prst="straightConnector1">
             <a:avLst/>
@@ -5552,7 +5548,17 @@
           <a:p>
             <a:r>
               <a:rPr lang="en-US" dirty="0" smtClean="0"/>
-              <a:t>Cool stuff about the filter bank</a:t>
+              <a:t>Window Size</a:t>
+            </a:r>
+          </a:p>
+          <a:p>
+            <a:r>
+              <a:rPr lang="en-US" dirty="0" smtClean="0"/>
+              <a:t>Number </a:t>
+            </a:r>
+            <a:r>
+              <a:rPr lang="en-US" smtClean="0"/>
+              <a:t>of Channels</a:t>
             </a:r>
             <a:endParaRPr lang="en-US" dirty="0"/>
           </a:p>
@@ -5712,10 +5718,29 @@
               <a:rPr lang="en-US" dirty="0" err="1" smtClean="0"/>
               <a:t>bufferizers</a:t>
             </a:r>
+            <a:endParaRPr lang="en-US" dirty="0" smtClean="0"/>
+          </a:p>
+          <a:p>
+            <a:r>
+              <a:rPr lang="en-US" dirty="0" smtClean="0"/>
+              <a:t>Pseudo-Acoustic Model</a:t>
+            </a:r>
+          </a:p>
+          <a:p>
+            <a:pPr lvl="1"/>
+            <a:r>
+              <a:rPr lang="en-US" dirty="0" err="1" smtClean="0"/>
+              <a:t>Haan</a:t>
+            </a:r>
+            <a:r>
+              <a:rPr lang="en-US" dirty="0" smtClean="0"/>
+              <a:t> model?</a:t>
+            </a:r>
             <a:r>
               <a:rPr lang="en-US" dirty="0" smtClean="0"/>
               <a:t> </a:t>
             </a:r>
+            <a:endParaRPr lang="en-US" dirty="0" smtClean="0"/>
           </a:p>
           <a:p>
             <a:r>

</xml_diff>

<commit_message>
Updated the presentation to include graphics and text.
</commit_message>
<xml_diff>
--- a/report/JET Audio Encoder.pptx
+++ b/report/JET Audio Encoder.pptx
@@ -8,12 +8,14 @@
     <p:sldId id="256" r:id="rId2"/>
     <p:sldId id="258" r:id="rId3"/>
     <p:sldId id="257" r:id="rId4"/>
-    <p:sldId id="259" r:id="rId5"/>
-    <p:sldId id="260" r:id="rId6"/>
-    <p:sldId id="261" r:id="rId7"/>
-    <p:sldId id="262" r:id="rId8"/>
-    <p:sldId id="263" r:id="rId9"/>
-    <p:sldId id="264" r:id="rId10"/>
+    <p:sldId id="266" r:id="rId5"/>
+    <p:sldId id="259" r:id="rId6"/>
+    <p:sldId id="265" r:id="rId7"/>
+    <p:sldId id="260" r:id="rId8"/>
+    <p:sldId id="261" r:id="rId9"/>
+    <p:sldId id="262" r:id="rId10"/>
+    <p:sldId id="263" r:id="rId11"/>
+    <p:sldId id="264" r:id="rId12"/>
   </p:sldIdLst>
   <p:sldSz cx="9144000" cy="6858000" type="screen4x3"/>
   <p:notesSz cx="6858000" cy="9144000"/>
@@ -740,7 +742,7 @@
           <a:p>
             <a:fld id="{0687A9EE-9FDB-45A0-9CB2-30AFE7A6E960}" type="datetimeFigureOut">
               <a:rPr lang="en-US" smtClean="0"/>
-              <a:t>5/3/2017</a:t>
+              <a:t>5/4/2017</a:t>
             </a:fld>
             <a:endParaRPr lang="en-US"/>
           </a:p>
@@ -936,7 +938,7 @@
           <a:p>
             <a:fld id="{0687A9EE-9FDB-45A0-9CB2-30AFE7A6E960}" type="datetimeFigureOut">
               <a:rPr lang="en-US" smtClean="0"/>
-              <a:t>5/3/2017</a:t>
+              <a:t>5/4/2017</a:t>
             </a:fld>
             <a:endParaRPr lang="en-US"/>
           </a:p>
@@ -1121,7 +1123,7 @@
           <a:p>
             <a:fld id="{0687A9EE-9FDB-45A0-9CB2-30AFE7A6E960}" type="datetimeFigureOut">
               <a:rPr lang="en-US" smtClean="0"/>
-              <a:t>5/3/2017</a:t>
+              <a:t>5/4/2017</a:t>
             </a:fld>
             <a:endParaRPr lang="en-US"/>
           </a:p>
@@ -1271,7 +1273,7 @@
           <a:p>
             <a:fld id="{0687A9EE-9FDB-45A0-9CB2-30AFE7A6E960}" type="datetimeFigureOut">
               <a:rPr lang="en-US" smtClean="0"/>
-              <a:t>5/3/2017</a:t>
+              <a:t>5/4/2017</a:t>
             </a:fld>
             <a:endParaRPr lang="en-US"/>
           </a:p>
@@ -1526,7 +1528,7 @@
           <a:p>
             <a:fld id="{0687A9EE-9FDB-45A0-9CB2-30AFE7A6E960}" type="datetimeFigureOut">
               <a:rPr lang="en-US" smtClean="0"/>
-              <a:t>5/3/2017</a:t>
+              <a:t>5/4/2017</a:t>
             </a:fld>
             <a:endParaRPr lang="en-US"/>
           </a:p>
@@ -1935,7 +1937,7 @@
           <a:p>
             <a:fld id="{0687A9EE-9FDB-45A0-9CB2-30AFE7A6E960}" type="datetimeFigureOut">
               <a:rPr lang="en-US" smtClean="0"/>
-              <a:t>5/3/2017</a:t>
+              <a:t>5/4/2017</a:t>
             </a:fld>
             <a:endParaRPr lang="en-US"/>
           </a:p>
@@ -2381,7 +2383,7 @@
           <a:p>
             <a:fld id="{0687A9EE-9FDB-45A0-9CB2-30AFE7A6E960}" type="datetimeFigureOut">
               <a:rPr lang="en-US" smtClean="0"/>
-              <a:t>5/3/2017</a:t>
+              <a:t>5/4/2017</a:t>
             </a:fld>
             <a:endParaRPr lang="en-US"/>
           </a:p>
@@ -2482,7 +2484,7 @@
           <a:p>
             <a:fld id="{0687A9EE-9FDB-45A0-9CB2-30AFE7A6E960}" type="datetimeFigureOut">
               <a:rPr lang="en-US" smtClean="0"/>
-              <a:t>5/3/2017</a:t>
+              <a:t>5/4/2017</a:t>
             </a:fld>
             <a:endParaRPr lang="en-US"/>
           </a:p>
@@ -2603,7 +2605,7 @@
           <a:p>
             <a:fld id="{0687A9EE-9FDB-45A0-9CB2-30AFE7A6E960}" type="datetimeFigureOut">
               <a:rPr lang="en-US" smtClean="0"/>
-              <a:t>5/3/2017</a:t>
+              <a:t>5/4/2017</a:t>
             </a:fld>
             <a:endParaRPr lang="en-US"/>
           </a:p>
@@ -2877,7 +2879,7 @@
           <a:p>
             <a:fld id="{0687A9EE-9FDB-45A0-9CB2-30AFE7A6E960}" type="datetimeFigureOut">
               <a:rPr lang="en-US" smtClean="0"/>
-              <a:t>5/3/2017</a:t>
+              <a:t>5/4/2017</a:t>
             </a:fld>
             <a:endParaRPr lang="en-US"/>
           </a:p>
@@ -3082,7 +3084,7 @@
           <a:p>
             <a:fld id="{0687A9EE-9FDB-45A0-9CB2-30AFE7A6E960}" type="datetimeFigureOut">
               <a:rPr lang="en-US" smtClean="0"/>
-              <a:t>5/3/2017</a:t>
+              <a:t>5/4/2017</a:t>
             </a:fld>
             <a:endParaRPr lang="en-US"/>
           </a:p>
@@ -4191,7 +4193,7 @@
           <a:p>
             <a:fld id="{0687A9EE-9FDB-45A0-9CB2-30AFE7A6E960}" type="datetimeFigureOut">
               <a:rPr lang="en-US" smtClean="0"/>
-              <a:t>5/3/2017</a:t>
+              <a:t>5/4/2017</a:t>
             </a:fld>
             <a:endParaRPr lang="en-US"/>
           </a:p>
@@ -4677,6 +4679,216 @@
 </p:sld>
 </file>
 
+<file path=ppt/slides/slide10.xml><?xml version="1.0" encoding="utf-8"?>
+<p:sld xmlns:a="http://schemas.openxmlformats.org/drawingml/2006/main" xmlns:r="http://schemas.openxmlformats.org/officeDocument/2006/relationships" xmlns:p="http://schemas.openxmlformats.org/presentationml/2006/main">
+  <p:cSld>
+    <p:spTree>
+      <p:nvGrpSpPr>
+        <p:cNvPr id="1" name=""/>
+        <p:cNvGrpSpPr/>
+        <p:nvPr/>
+      </p:nvGrpSpPr>
+      <p:grpSpPr>
+        <a:xfrm>
+          <a:off x="0" y="0"/>
+          <a:ext cx="0" cy="0"/>
+          <a:chOff x="0" y="0"/>
+          <a:chExt cx="0" cy="0"/>
+        </a:xfrm>
+      </p:grpSpPr>
+      <p:sp>
+        <p:nvSpPr>
+          <p:cNvPr id="2" name="Content Placeholder 1"/>
+          <p:cNvSpPr>
+            <a:spLocks noGrp="1"/>
+          </p:cNvSpPr>
+          <p:nvPr>
+            <p:ph idx="1"/>
+          </p:nvPr>
+        </p:nvSpPr>
+        <p:spPr/>
+        <p:txBody>
+          <a:bodyPr/>
+          <a:lstStyle/>
+          <a:p>
+            <a:r>
+              <a:rPr lang="en-US" dirty="0" smtClean="0"/>
+              <a:t>Writing data to binary file</a:t>
+            </a:r>
+          </a:p>
+          <a:p>
+            <a:r>
+              <a:rPr lang="en-US" dirty="0" smtClean="0"/>
+              <a:t>No standard format was used</a:t>
+            </a:r>
+          </a:p>
+          <a:p>
+            <a:r>
+              <a:rPr lang="en-US" dirty="0" smtClean="0"/>
+              <a:t>Enabled quick writing and reading</a:t>
+            </a:r>
+            <a:endParaRPr lang="en-US" dirty="0"/>
+          </a:p>
+        </p:txBody>
+      </p:sp>
+      <p:sp>
+        <p:nvSpPr>
+          <p:cNvPr id="3" name="Title 2"/>
+          <p:cNvSpPr>
+            <a:spLocks noGrp="1"/>
+          </p:cNvSpPr>
+          <p:nvPr>
+            <p:ph type="title"/>
+          </p:nvPr>
+        </p:nvSpPr>
+        <p:spPr/>
+        <p:txBody>
+          <a:bodyPr/>
+          <a:lstStyle/>
+          <a:p>
+            <a:r>
+              <a:rPr lang="en-US" dirty="0" smtClean="0"/>
+              <a:t>Data Serialization</a:t>
+            </a:r>
+            <a:endParaRPr lang="en-US" dirty="0"/>
+          </a:p>
+        </p:txBody>
+      </p:sp>
+    </p:spTree>
+    <p:extLst>
+      <p:ext uri="{BB962C8B-B14F-4D97-AF65-F5344CB8AC3E}">
+        <p14:creationId xmlns:p14="http://schemas.microsoft.com/office/powerpoint/2010/main" val="2879479575"/>
+      </p:ext>
+    </p:extLst>
+  </p:cSld>
+  <p:clrMapOvr>
+    <a:masterClrMapping/>
+  </p:clrMapOvr>
+</p:sld>
+</file>
+
+<file path=ppt/slides/slide11.xml><?xml version="1.0" encoding="utf-8"?>
+<p:sld xmlns:a="http://schemas.openxmlformats.org/drawingml/2006/main" xmlns:r="http://schemas.openxmlformats.org/officeDocument/2006/relationships" xmlns:p="http://schemas.openxmlformats.org/presentationml/2006/main">
+  <p:cSld>
+    <p:spTree>
+      <p:nvGrpSpPr>
+        <p:cNvPr id="1" name=""/>
+        <p:cNvGrpSpPr/>
+        <p:nvPr/>
+      </p:nvGrpSpPr>
+      <p:grpSpPr>
+        <a:xfrm>
+          <a:off x="0" y="0"/>
+          <a:ext cx="0" cy="0"/>
+          <a:chOff x="0" y="0"/>
+          <a:chExt cx="0" cy="0"/>
+        </a:xfrm>
+      </p:grpSpPr>
+      <p:sp>
+        <p:nvSpPr>
+          <p:cNvPr id="2" name="Content Placeholder 1"/>
+          <p:cNvSpPr>
+            <a:spLocks noGrp="1"/>
+          </p:cNvSpPr>
+          <p:nvPr>
+            <p:ph idx="1"/>
+          </p:nvPr>
+        </p:nvSpPr>
+        <p:spPr/>
+        <p:txBody>
+          <a:bodyPr/>
+          <a:lstStyle/>
+          <a:p>
+            <a:r>
+              <a:rPr lang="en-US" dirty="0"/>
+              <a:t>Compression </a:t>
+            </a:r>
+            <a:r>
+              <a:rPr lang="en-US" dirty="0" smtClean="0"/>
+              <a:t>Pipeline</a:t>
+            </a:r>
+          </a:p>
+          <a:p>
+            <a:r>
+              <a:rPr lang="en-US" dirty="0" smtClean="0"/>
+              <a:t>Metrics Evaluated</a:t>
+            </a:r>
+            <a:endParaRPr lang="en-US" dirty="0"/>
+          </a:p>
+          <a:p>
+            <a:r>
+              <a:rPr lang="en-US" dirty="0"/>
+              <a:t>Filter Bank</a:t>
+            </a:r>
+          </a:p>
+          <a:p>
+            <a:r>
+              <a:rPr lang="en-US" dirty="0"/>
+              <a:t>Modified Discrete Cosine Transform (MDCT)</a:t>
+            </a:r>
+          </a:p>
+          <a:p>
+            <a:r>
+              <a:rPr lang="en-US" dirty="0"/>
+              <a:t>Byte </a:t>
+            </a:r>
+            <a:r>
+              <a:rPr lang="en-US" dirty="0" err="1"/>
+              <a:t>Bufferizers</a:t>
+            </a:r>
+            <a:endParaRPr lang="en-US" dirty="0"/>
+          </a:p>
+          <a:p>
+            <a:r>
+              <a:rPr lang="en-US" dirty="0"/>
+              <a:t>Huffman Encoder</a:t>
+            </a:r>
+          </a:p>
+          <a:p>
+            <a:r>
+              <a:rPr lang="en-US" dirty="0" smtClean="0"/>
+              <a:t>Serialization</a:t>
+            </a:r>
+            <a:endParaRPr lang="en-US" dirty="0"/>
+          </a:p>
+        </p:txBody>
+      </p:sp>
+      <p:sp>
+        <p:nvSpPr>
+          <p:cNvPr id="3" name="Title 2"/>
+          <p:cNvSpPr>
+            <a:spLocks noGrp="1"/>
+          </p:cNvSpPr>
+          <p:nvPr>
+            <p:ph type="title"/>
+          </p:nvPr>
+        </p:nvSpPr>
+        <p:spPr/>
+        <p:txBody>
+          <a:bodyPr/>
+          <a:lstStyle/>
+          <a:p>
+            <a:r>
+              <a:rPr lang="en-US" dirty="0" smtClean="0"/>
+              <a:t>Summary</a:t>
+            </a:r>
+            <a:endParaRPr lang="en-US" dirty="0"/>
+          </a:p>
+        </p:txBody>
+      </p:sp>
+    </p:spTree>
+    <p:extLst>
+      <p:ext uri="{BB962C8B-B14F-4D97-AF65-F5344CB8AC3E}">
+        <p14:creationId xmlns:p14="http://schemas.microsoft.com/office/powerpoint/2010/main" val="1677742152"/>
+      </p:ext>
+    </p:extLst>
+  </p:cSld>
+  <p:clrMapOvr>
+    <a:masterClrMapping/>
+  </p:clrMapOvr>
+</p:sld>
+</file>
+
 <file path=ppt/slides/slide2.xml><?xml version="1.0" encoding="utf-8"?>
 <p:sld xmlns:a="http://schemas.openxmlformats.org/drawingml/2006/main" xmlns:r="http://schemas.openxmlformats.org/officeDocument/2006/relationships" xmlns:p="http://schemas.openxmlformats.org/presentationml/2006/main">
   <p:cSld>
@@ -4711,8 +4923,19 @@
           <a:p>
             <a:r>
               <a:rPr lang="en-US" dirty="0" smtClean="0"/>
-              <a:t>Compression Pipeline</a:t>
-            </a:r>
+              <a:t>Compression </a:t>
+            </a:r>
+            <a:r>
+              <a:rPr lang="en-US" dirty="0" smtClean="0"/>
+              <a:t>Pipeline</a:t>
+            </a:r>
+          </a:p>
+          <a:p>
+            <a:r>
+              <a:rPr lang="en-US" dirty="0" smtClean="0"/>
+              <a:t>Metrics Evaluated</a:t>
+            </a:r>
+            <a:endParaRPr lang="en-US" dirty="0" smtClean="0"/>
           </a:p>
           <a:p>
             <a:r>
@@ -4830,7 +5053,6 @@
           <a:bodyPr/>
           <a:lstStyle/>
           <a:p>
-            <a:pPr algn="ctr"/>
             <a:r>
               <a:rPr lang="en-US" dirty="0" smtClean="0"/>
               <a:t>Audio Compression Pipeline</a:t>
@@ -5548,18 +5770,32 @@
           <a:p>
             <a:r>
               <a:rPr lang="en-US" dirty="0" smtClean="0"/>
-              <a:t>Window Size</a:t>
+              <a:t>Compress / Decompress Time </a:t>
             </a:r>
           </a:p>
           <a:p>
             <a:r>
               <a:rPr lang="en-US" dirty="0" smtClean="0"/>
-              <a:t>Number </a:t>
-            </a:r>
-            <a:r>
-              <a:rPr lang="en-US" smtClean="0"/>
-              <a:t>of Channels</a:t>
-            </a:r>
+              <a:t>Compression Ratio </a:t>
+            </a:r>
+            <a:br>
+              <a:rPr lang="en-US" dirty="0" smtClean="0"/>
+            </a:br>
+            <a:r>
+              <a:rPr lang="en-US" dirty="0" smtClean="0"/>
+              <a:t>(input size vs output size)</a:t>
+            </a:r>
+          </a:p>
+          <a:p>
+            <a:r>
+              <a:rPr lang="en-US" dirty="0" smtClean="0"/>
+              <a:t>RMS Error</a:t>
+            </a:r>
+          </a:p>
+          <a:p>
+            <a:endParaRPr lang="en-US" dirty="0" smtClean="0"/>
+          </a:p>
+          <a:p>
             <a:endParaRPr lang="en-US" dirty="0"/>
           </a:p>
         </p:txBody>
@@ -5581,7 +5817,7 @@
           <a:p>
             <a:r>
               <a:rPr lang="en-US" dirty="0" smtClean="0"/>
-              <a:t>Filter Bank Step</a:t>
+              <a:t>Metrics Evaluated</a:t>
             </a:r>
             <a:endParaRPr lang="en-US" dirty="0"/>
           </a:p>
@@ -5590,7 +5826,7 @@
     </p:spTree>
     <p:extLst>
       <p:ext uri="{BB962C8B-B14F-4D97-AF65-F5344CB8AC3E}">
-        <p14:creationId xmlns:p14="http://schemas.microsoft.com/office/powerpoint/2010/main" val="3820966249"/>
+        <p14:creationId xmlns:p14="http://schemas.microsoft.com/office/powerpoint/2010/main" val="4213318400"/>
       </p:ext>
     </p:extLst>
   </p:cSld>
@@ -5629,46 +5865,184 @@
         </p:nvSpPr>
         <p:spPr/>
         <p:txBody>
+          <a:bodyPr>
+            <a:normAutofit/>
+          </a:bodyPr>
+          <a:lstStyle/>
+          <a:p>
+            <a:r>
+              <a:rPr lang="en-US" sz="2800" dirty="0" smtClean="0"/>
+              <a:t>Variable Parameters</a:t>
+            </a:r>
+          </a:p>
+          <a:p>
+            <a:pPr lvl="1"/>
+            <a:r>
+              <a:rPr lang="en-US" sz="2400" dirty="0" smtClean="0"/>
+              <a:t>Filter-bank Length</a:t>
+            </a:r>
+            <a:endParaRPr lang="en-US" sz="2400" dirty="0" smtClean="0"/>
+          </a:p>
+          <a:p>
+            <a:pPr lvl="1"/>
+            <a:r>
+              <a:rPr lang="en-US" sz="2400" dirty="0" smtClean="0"/>
+              <a:t>Number of Sub-bands</a:t>
+            </a:r>
+            <a:endParaRPr lang="en-US" sz="2400" dirty="0"/>
+          </a:p>
+        </p:txBody>
+      </p:sp>
+      <p:sp>
+        <p:nvSpPr>
+          <p:cNvPr id="3" name="Title 2"/>
+          <p:cNvSpPr>
+            <a:spLocks noGrp="1"/>
+          </p:cNvSpPr>
+          <p:nvPr>
+            <p:ph type="title"/>
+          </p:nvPr>
+        </p:nvSpPr>
+        <p:spPr/>
+        <p:txBody>
           <a:bodyPr/>
           <a:lstStyle/>
           <a:p>
             <a:r>
               <a:rPr lang="en-US" dirty="0" smtClean="0"/>
-              <a:t>Cool stuff about the MDCT</a:t>
+              <a:t>Filter Bank Step</a:t>
             </a:r>
             <a:endParaRPr lang="en-US" dirty="0"/>
           </a:p>
         </p:txBody>
       </p:sp>
-      <p:sp>
-        <p:nvSpPr>
-          <p:cNvPr id="3" name="Title 2"/>
-          <p:cNvSpPr>
-            <a:spLocks noGrp="1"/>
-          </p:cNvSpPr>
-          <p:nvPr>
-            <p:ph type="title"/>
-          </p:nvPr>
-        </p:nvSpPr>
-        <p:spPr/>
-        <p:txBody>
-          <a:bodyPr>
-            <a:normAutofit fontScale="90000"/>
-          </a:bodyPr>
-          <a:lstStyle/>
-          <a:p>
-            <a:r>
-              <a:rPr lang="en-US" dirty="0" smtClean="0"/>
-              <a:t>Modified Discrete Cosine Transform</a:t>
-            </a:r>
-            <a:endParaRPr lang="en-US" dirty="0"/>
-          </a:p>
-        </p:txBody>
-      </p:sp>
+      <p:pic>
+        <p:nvPicPr>
+          <p:cNvPr id="2050" name="Picture 2" descr="C:\Users\Joshua Musick\workspace\Alg_Term_Project\data\analysis\stringsWav\FilterBank Length_RMS Error.png"/>
+          <p:cNvPicPr>
+            <a:picLocks noChangeAspect="1" noChangeArrowheads="1"/>
+          </p:cNvPicPr>
+          <p:nvPr/>
+        </p:nvPicPr>
+        <p:blipFill>
+          <a:blip r:embed="rId2">
+            <a:extLst>
+              <a:ext uri="{28A0092B-C50C-407E-A947-70E740481C1C}">
+                <a14:useLocalDpi xmlns:a14="http://schemas.microsoft.com/office/drawing/2010/main" val="0"/>
+              </a:ext>
+            </a:extLst>
+          </a:blip>
+          <a:srcRect/>
+          <a:stretch>
+            <a:fillRect/>
+          </a:stretch>
+        </p:blipFill>
+        <p:spPr bwMode="auto">
+          <a:xfrm>
+            <a:off x="4889273" y="246062"/>
+            <a:ext cx="4111626" cy="2878138"/>
+          </a:xfrm>
+          <a:prstGeom prst="rect">
+            <a:avLst/>
+          </a:prstGeom>
+          <a:noFill/>
+          <a:extLst>
+            <a:ext uri="{909E8E84-426E-40DD-AFC4-6F175D3DCCD1}">
+              <a14:hiddenFill xmlns:a14="http://schemas.microsoft.com/office/drawing/2010/main">
+                <a:solidFill>
+                  <a:srgbClr val="FFFFFF"/>
+                </a:solidFill>
+              </a14:hiddenFill>
+            </a:ext>
+          </a:extLst>
+        </p:spPr>
+      </p:pic>
+      <p:pic>
+        <p:nvPicPr>
+          <p:cNvPr id="2051" name="Picture 3" descr="C:\Users\Joshua Musick\workspace\Alg_Term_Project\data\analysis\stringsWav\FilterBank Num SubBands _Total Compression time (ms).png"/>
+          <p:cNvPicPr>
+            <a:picLocks noChangeAspect="1" noChangeArrowheads="1"/>
+          </p:cNvPicPr>
+          <p:nvPr/>
+        </p:nvPicPr>
+        <p:blipFill>
+          <a:blip r:embed="rId3">
+            <a:extLst>
+              <a:ext uri="{28A0092B-C50C-407E-A947-70E740481C1C}">
+                <a14:useLocalDpi xmlns:a14="http://schemas.microsoft.com/office/drawing/2010/main" val="0"/>
+              </a:ext>
+            </a:extLst>
+          </a:blip>
+          <a:srcRect/>
+          <a:stretch>
+            <a:fillRect/>
+          </a:stretch>
+        </p:blipFill>
+        <p:spPr bwMode="auto">
+          <a:xfrm>
+            <a:off x="4864327" y="3124200"/>
+            <a:ext cx="4136572" cy="2895600"/>
+          </a:xfrm>
+          <a:prstGeom prst="rect">
+            <a:avLst/>
+          </a:prstGeom>
+          <a:noFill/>
+          <a:extLst>
+            <a:ext uri="{909E8E84-426E-40DD-AFC4-6F175D3DCCD1}">
+              <a14:hiddenFill xmlns:a14="http://schemas.microsoft.com/office/drawing/2010/main">
+                <a:solidFill>
+                  <a:srgbClr val="FFFFFF"/>
+                </a:solidFill>
+              </a14:hiddenFill>
+            </a:ext>
+          </a:extLst>
+        </p:spPr>
+      </p:pic>
+      <p:pic>
+        <p:nvPicPr>
+          <p:cNvPr id="2052" name="Picture 4" descr="C:\Users\Joshua Musick\workspace\Alg_Term_Project\data\analysis\stringsWav\FilterBank Num SubBands _Compression Ratio.png"/>
+          <p:cNvPicPr>
+            <a:picLocks noChangeAspect="1" noChangeArrowheads="1"/>
+          </p:cNvPicPr>
+          <p:nvPr/>
+        </p:nvPicPr>
+        <p:blipFill>
+          <a:blip r:embed="rId4">
+            <a:extLst>
+              <a:ext uri="{28A0092B-C50C-407E-A947-70E740481C1C}">
+                <a14:useLocalDpi xmlns:a14="http://schemas.microsoft.com/office/drawing/2010/main" val="0"/>
+              </a:ext>
+            </a:extLst>
+          </a:blip>
+          <a:srcRect/>
+          <a:stretch>
+            <a:fillRect/>
+          </a:stretch>
+        </p:blipFill>
+        <p:spPr bwMode="auto">
+          <a:xfrm>
+            <a:off x="811668" y="3124200"/>
+            <a:ext cx="4052659" cy="2836862"/>
+          </a:xfrm>
+          <a:prstGeom prst="rect">
+            <a:avLst/>
+          </a:prstGeom>
+          <a:noFill/>
+          <a:extLst>
+            <a:ext uri="{909E8E84-426E-40DD-AFC4-6F175D3DCCD1}">
+              <a14:hiddenFill xmlns:a14="http://schemas.microsoft.com/office/drawing/2010/main">
+                <a:solidFill>
+                  <a:srgbClr val="FFFFFF"/>
+                </a:solidFill>
+              </a14:hiddenFill>
+            </a:ext>
+          </a:extLst>
+        </p:spPr>
+      </p:pic>
     </p:spTree>
     <p:extLst>
       <p:ext uri="{BB962C8B-B14F-4D97-AF65-F5344CB8AC3E}">
-        <p14:creationId xmlns:p14="http://schemas.microsoft.com/office/powerpoint/2010/main" val="683678322"/>
+        <p14:creationId xmlns:p14="http://schemas.microsoft.com/office/powerpoint/2010/main" val="3820966249"/>
       </p:ext>
     </p:extLst>
   </p:cSld>
@@ -5712,60 +6086,14 @@
           <a:p>
             <a:r>
               <a:rPr lang="en-US" dirty="0" smtClean="0"/>
-              <a:t>Stuff about the byte </a:t>
-            </a:r>
-            <a:r>
-              <a:rPr lang="en-US" dirty="0" err="1" smtClean="0"/>
-              <a:t>bufferizers</a:t>
-            </a:r>
-            <a:endParaRPr lang="en-US" dirty="0" smtClean="0"/>
-          </a:p>
-          <a:p>
+              <a:t>Variable Parameters</a:t>
+            </a:r>
+          </a:p>
+          <a:p>
+            <a:pPr lvl="1"/>
             <a:r>
               <a:rPr lang="en-US" dirty="0" smtClean="0"/>
-              <a:t>Pseudo-Acoustic Model</a:t>
-            </a:r>
-          </a:p>
-          <a:p>
-            <a:pPr lvl="1"/>
-            <a:r>
-              <a:rPr lang="en-US" dirty="0" err="1" smtClean="0"/>
-              <a:t>Haan</a:t>
-            </a:r>
-            <a:r>
-              <a:rPr lang="en-US" dirty="0" smtClean="0"/>
-              <a:t> model?</a:t>
-            </a:r>
-            <a:r>
-              <a:rPr lang="en-US" dirty="0" smtClean="0"/>
-              <a:t> </a:t>
-            </a:r>
-            <a:endParaRPr lang="en-US" dirty="0" smtClean="0"/>
-          </a:p>
-          <a:p>
-            <a:r>
-              <a:rPr lang="en-US" dirty="0" smtClean="0"/>
-              <a:t>Adaptive Version</a:t>
-            </a:r>
-          </a:p>
-          <a:p>
-            <a:pPr lvl="1"/>
-            <a:r>
-              <a:rPr lang="en-US" dirty="0" smtClean="0"/>
-              <a:t>Stuff</a:t>
-            </a:r>
-          </a:p>
-          <a:p>
-            <a:r>
-              <a:rPr lang="en-US" dirty="0" smtClean="0"/>
-              <a:t>Non-Adaptive Version</a:t>
-            </a:r>
-          </a:p>
-          <a:p>
-            <a:pPr lvl="1"/>
-            <a:r>
-              <a:rPr lang="en-US" dirty="0" smtClean="0"/>
-              <a:t>Stuff</a:t>
+              <a:t>Window Length</a:t>
             </a:r>
             <a:endParaRPr lang="en-US" dirty="0"/>
           </a:p>
@@ -5788,20 +6116,98 @@
           <a:p>
             <a:r>
               <a:rPr lang="en-US" dirty="0" smtClean="0"/>
-              <a:t>Byte </a:t>
-            </a:r>
-            <a:r>
-              <a:rPr lang="en-US" dirty="0" err="1" smtClean="0"/>
-              <a:t>Bufferizers</a:t>
+              <a:t>Filter Bank Step (cont.)</a:t>
             </a:r>
             <a:endParaRPr lang="en-US" dirty="0"/>
           </a:p>
         </p:txBody>
       </p:sp>
+      <p:pic>
+        <p:nvPicPr>
+          <p:cNvPr id="3074" name="Picture 2" descr="C:\Users\Joshua Musick\workspace\Alg_Term_Project\data\analysis\stringsWav\Window Length_Total Compression time (ms).png"/>
+          <p:cNvPicPr>
+            <a:picLocks noChangeAspect="1" noChangeArrowheads="1"/>
+          </p:cNvPicPr>
+          <p:nvPr/>
+        </p:nvPicPr>
+        <p:blipFill>
+          <a:blip r:embed="rId2">
+            <a:extLst>
+              <a:ext uri="{28A0092B-C50C-407E-A947-70E740481C1C}">
+                <a14:useLocalDpi xmlns:a14="http://schemas.microsoft.com/office/drawing/2010/main" val="0"/>
+              </a:ext>
+            </a:extLst>
+          </a:blip>
+          <a:srcRect/>
+          <a:stretch>
+            <a:fillRect/>
+          </a:stretch>
+        </p:blipFill>
+        <p:spPr bwMode="auto">
+          <a:xfrm>
+            <a:off x="4572000" y="2546396"/>
+            <a:ext cx="4347576" cy="3043303"/>
+          </a:xfrm>
+          <a:prstGeom prst="rect">
+            <a:avLst/>
+          </a:prstGeom>
+          <a:noFill/>
+          <a:extLst>
+            <a:ext uri="{909E8E84-426E-40DD-AFC4-6F175D3DCCD1}">
+              <a14:hiddenFill xmlns:a14="http://schemas.microsoft.com/office/drawing/2010/main">
+                <a:solidFill>
+                  <a:srgbClr val="FFFFFF"/>
+                </a:solidFill>
+              </a14:hiddenFill>
+            </a:ext>
+          </a:extLst>
+        </p:spPr>
+      </p:pic>
+      <p:pic>
+        <p:nvPicPr>
+          <p:cNvPr id="3075" name="Picture 3" descr="C:\Users\Joshua Musick\workspace\Alg_Term_Project\data\analysis\stringsWav\Window Length_RMS Error.png"/>
+          <p:cNvPicPr>
+            <a:picLocks noChangeAspect="1" noChangeArrowheads="1"/>
+          </p:cNvPicPr>
+          <p:nvPr/>
+        </p:nvPicPr>
+        <p:blipFill>
+          <a:blip r:embed="rId3">
+            <a:extLst>
+              <a:ext uri="{28A0092B-C50C-407E-A947-70E740481C1C}">
+                <a14:useLocalDpi xmlns:a14="http://schemas.microsoft.com/office/drawing/2010/main" val="0"/>
+              </a:ext>
+            </a:extLst>
+          </a:blip>
+          <a:srcRect/>
+          <a:stretch>
+            <a:fillRect/>
+          </a:stretch>
+        </p:blipFill>
+        <p:spPr bwMode="auto">
+          <a:xfrm>
+            <a:off x="304800" y="2590800"/>
+            <a:ext cx="4220709" cy="2954496"/>
+          </a:xfrm>
+          <a:prstGeom prst="rect">
+            <a:avLst/>
+          </a:prstGeom>
+          <a:noFill/>
+          <a:extLst>
+            <a:ext uri="{909E8E84-426E-40DD-AFC4-6F175D3DCCD1}">
+              <a14:hiddenFill xmlns:a14="http://schemas.microsoft.com/office/drawing/2010/main">
+                <a:solidFill>
+                  <a:srgbClr val="FFFFFF"/>
+                </a:solidFill>
+              </a14:hiddenFill>
+            </a:ext>
+          </a:extLst>
+        </p:spPr>
+      </p:pic>
     </p:spTree>
     <p:extLst>
       <p:ext uri="{BB962C8B-B14F-4D97-AF65-F5344CB8AC3E}">
-        <p14:creationId xmlns:p14="http://schemas.microsoft.com/office/powerpoint/2010/main" val="1277048495"/>
+        <p14:creationId xmlns:p14="http://schemas.microsoft.com/office/powerpoint/2010/main" val="1426029419"/>
       </p:ext>
     </p:extLst>
   </p:cSld>
@@ -5843,7 +6249,31 @@
           <a:bodyPr/>
           <a:lstStyle/>
           <a:p>
-            <a:endParaRPr lang="en-US"/>
+            <a:r>
+              <a:rPr lang="en-US" dirty="0" smtClean="0"/>
+              <a:t>Separates sub-bands into smaller bands using </a:t>
+            </a:r>
+            <a:r>
+              <a:rPr lang="en-US" dirty="0"/>
+              <a:t>F</a:t>
+            </a:r>
+            <a:r>
+              <a:rPr lang="en-US" dirty="0" smtClean="0"/>
+              <a:t>ourier transforms </a:t>
+            </a:r>
+          </a:p>
+          <a:p>
+            <a:r>
+              <a:rPr lang="en-US" dirty="0" smtClean="0"/>
+              <a:t>Eliminates frequencies too close to distinguish</a:t>
+            </a:r>
+          </a:p>
+          <a:p>
+            <a:r>
+              <a:rPr lang="en-US" dirty="0" smtClean="0"/>
+              <a:t>This wasn’t used in the test suite</a:t>
+            </a:r>
+            <a:endParaRPr lang="en-US" dirty="0"/>
           </a:p>
         </p:txBody>
       </p:sp>
@@ -5859,12 +6289,14 @@
         </p:nvSpPr>
         <p:spPr/>
         <p:txBody>
-          <a:bodyPr/>
+          <a:bodyPr>
+            <a:normAutofit fontScale="90000"/>
+          </a:bodyPr>
           <a:lstStyle/>
           <a:p>
             <a:r>
               <a:rPr lang="en-US" dirty="0" smtClean="0"/>
-              <a:t>Huffman Encoder</a:t>
+              <a:t>Modified Discrete Cosine Transform</a:t>
             </a:r>
             <a:endParaRPr lang="en-US" dirty="0"/>
           </a:p>
@@ -5873,7 +6305,7 @@
     </p:spTree>
     <p:extLst>
       <p:ext uri="{BB962C8B-B14F-4D97-AF65-F5344CB8AC3E}">
-        <p14:creationId xmlns:p14="http://schemas.microsoft.com/office/powerpoint/2010/main" val="1424251591"/>
+        <p14:creationId xmlns:p14="http://schemas.microsoft.com/office/powerpoint/2010/main" val="683678322"/>
       </p:ext>
     </p:extLst>
   </p:cSld>
@@ -5915,7 +6347,28 @@
           <a:bodyPr/>
           <a:lstStyle/>
           <a:p>
-            <a:endParaRPr lang="en-US"/>
+            <a:r>
+              <a:rPr lang="en-US" dirty="0" smtClean="0"/>
+              <a:t>Pseudo-Acoustic </a:t>
+            </a:r>
+            <a:r>
+              <a:rPr lang="en-US" dirty="0" smtClean="0"/>
+              <a:t>Model</a:t>
+            </a:r>
+          </a:p>
+          <a:p>
+            <a:r>
+              <a:rPr lang="en-US" dirty="0" smtClean="0"/>
+              <a:t>Adaptive vs </a:t>
+            </a:r>
+            <a:br>
+              <a:rPr lang="en-US" dirty="0" smtClean="0"/>
+            </a:br>
+            <a:r>
+              <a:rPr lang="en-US" dirty="0" smtClean="0"/>
+              <a:t>Non-Adaptive</a:t>
+            </a:r>
+            <a:endParaRPr lang="en-US" dirty="0"/>
           </a:p>
         </p:txBody>
       </p:sp>
@@ -5936,16 +6389,143 @@
           <a:p>
             <a:r>
               <a:rPr lang="en-US" dirty="0" smtClean="0"/>
-              <a:t>Data Serialization</a:t>
+              <a:t>Byte </a:t>
+            </a:r>
+            <a:r>
+              <a:rPr lang="en-US" dirty="0" err="1" smtClean="0"/>
+              <a:t>Bufferizers</a:t>
             </a:r>
             <a:endParaRPr lang="en-US" dirty="0"/>
           </a:p>
         </p:txBody>
       </p:sp>
+      <p:pic>
+        <p:nvPicPr>
+          <p:cNvPr id="1026" name="Picture 2" descr="C:\Users\Joshua Musick\workspace\Alg_Term_Project\data\analysis\stringsWav\Adaptive Byte Buff_Compression Ratio.png"/>
+          <p:cNvPicPr>
+            <a:picLocks noChangeAspect="1" noChangeArrowheads="1"/>
+          </p:cNvPicPr>
+          <p:nvPr/>
+        </p:nvPicPr>
+        <p:blipFill>
+          <a:blip r:embed="rId2">
+            <a:extLst>
+              <a:ext uri="{28A0092B-C50C-407E-A947-70E740481C1C}">
+                <a14:useLocalDpi xmlns:a14="http://schemas.microsoft.com/office/drawing/2010/main" val="0"/>
+              </a:ext>
+            </a:extLst>
+          </a:blip>
+          <a:srcRect/>
+          <a:stretch>
+            <a:fillRect/>
+          </a:stretch>
+        </p:blipFill>
+        <p:spPr bwMode="auto">
+          <a:xfrm>
+            <a:off x="4891058" y="1066800"/>
+            <a:ext cx="3948143" cy="2400300"/>
+          </a:xfrm>
+          <a:prstGeom prst="rect">
+            <a:avLst/>
+          </a:prstGeom>
+          <a:noFill/>
+          <a:extLst>
+            <a:ext uri="{909E8E84-426E-40DD-AFC4-6F175D3DCCD1}">
+              <a14:hiddenFill xmlns:a14="http://schemas.microsoft.com/office/drawing/2010/main">
+                <a:solidFill>
+                  <a:srgbClr val="FFFFFF"/>
+                </a:solidFill>
+              </a14:hiddenFill>
+            </a:ext>
+          </a:extLst>
+        </p:spPr>
+      </p:pic>
+      <p:pic>
+        <p:nvPicPr>
+          <p:cNvPr id="1027" name="Picture 3" descr="C:\Users\Joshua Musick\workspace\Alg_Term_Project\data\analysis\stringsWav\Model f1_RMS Error.png"/>
+          <p:cNvPicPr>
+            <a:picLocks noChangeAspect="1" noChangeArrowheads="1"/>
+          </p:cNvPicPr>
+          <p:nvPr/>
+        </p:nvPicPr>
+        <p:blipFill>
+          <a:blip r:embed="rId3">
+            <a:extLst>
+              <a:ext uri="{28A0092B-C50C-407E-A947-70E740481C1C}">
+                <a14:useLocalDpi xmlns:a14="http://schemas.microsoft.com/office/drawing/2010/main" val="0"/>
+              </a:ext>
+            </a:extLst>
+          </a:blip>
+          <a:srcRect/>
+          <a:stretch>
+            <a:fillRect/>
+          </a:stretch>
+        </p:blipFill>
+        <p:spPr bwMode="auto">
+          <a:xfrm>
+            <a:off x="4891058" y="3477070"/>
+            <a:ext cx="3983038" cy="2788126"/>
+          </a:xfrm>
+          <a:prstGeom prst="rect">
+            <a:avLst/>
+          </a:prstGeom>
+          <a:noFill/>
+          <a:extLst>
+            <a:ext uri="{909E8E84-426E-40DD-AFC4-6F175D3DCCD1}">
+              <a14:hiddenFill xmlns:a14="http://schemas.microsoft.com/office/drawing/2010/main">
+                <a:solidFill>
+                  <a:srgbClr val="FFFFFF"/>
+                </a:solidFill>
+              </a14:hiddenFill>
+            </a:ext>
+          </a:extLst>
+        </p:spPr>
+      </p:pic>
+      <p:pic>
+        <p:nvPicPr>
+          <p:cNvPr id="1028" name="Picture 4" descr="C:\Users\Joshua Musick\workspace\Alg_Term_Project\data\analysis\stringsWav\Model f2_Compression Ratio.png"/>
+          <p:cNvPicPr>
+            <a:picLocks noChangeAspect="1" noChangeArrowheads="1"/>
+          </p:cNvPicPr>
+          <p:nvPr/>
+        </p:nvPicPr>
+        <p:blipFill>
+          <a:blip r:embed="rId4">
+            <a:extLst>
+              <a:ext uri="{28A0092B-C50C-407E-A947-70E740481C1C}">
+                <a14:useLocalDpi xmlns:a14="http://schemas.microsoft.com/office/drawing/2010/main" val="0"/>
+              </a:ext>
+            </a:extLst>
+          </a:blip>
+          <a:srcRect/>
+          <a:stretch>
+            <a:fillRect/>
+          </a:stretch>
+        </p:blipFill>
+        <p:spPr bwMode="auto">
+          <a:xfrm>
+            <a:off x="685800" y="3461966"/>
+            <a:ext cx="3982358" cy="2787650"/>
+          </a:xfrm>
+          <a:prstGeom prst="rect">
+            <a:avLst/>
+          </a:prstGeom>
+          <a:noFill/>
+          <a:extLst>
+            <a:ext uri="{909E8E84-426E-40DD-AFC4-6F175D3DCCD1}">
+              <a14:hiddenFill xmlns:a14="http://schemas.microsoft.com/office/drawing/2010/main">
+                <a:solidFill>
+                  <a:srgbClr val="FFFFFF"/>
+                </a:solidFill>
+              </a14:hiddenFill>
+            </a:ext>
+          </a:extLst>
+        </p:spPr>
+      </p:pic>
     </p:spTree>
     <p:extLst>
       <p:ext uri="{BB962C8B-B14F-4D97-AF65-F5344CB8AC3E}">
-        <p14:creationId xmlns:p14="http://schemas.microsoft.com/office/powerpoint/2010/main" val="2879479575"/>
+        <p14:creationId xmlns:p14="http://schemas.microsoft.com/office/powerpoint/2010/main" val="1277048495"/>
       </p:ext>
     </p:extLst>
   </p:cSld>
@@ -5988,45 +6568,10 @@
           <a:lstStyle/>
           <a:p>
             <a:r>
-              <a:rPr lang="en-US" dirty="0"/>
-              <a:t>Compression Pipeline</a:t>
-            </a:r>
-          </a:p>
-          <a:p>
-            <a:r>
-              <a:rPr lang="en-US" dirty="0"/>
-              <a:t>Filter Bank</a:t>
-            </a:r>
-          </a:p>
-          <a:p>
-            <a:r>
-              <a:rPr lang="en-US" dirty="0"/>
-              <a:t>Modified Discrete Cosine Transform (MDCT)</a:t>
-            </a:r>
-          </a:p>
-          <a:p>
-            <a:r>
-              <a:rPr lang="en-US" dirty="0"/>
-              <a:t>Byte </a:t>
-            </a:r>
-            <a:r>
-              <a:rPr lang="en-US" dirty="0" err="1"/>
-              <a:t>Bufferizers</a:t>
+              <a:rPr lang="en-US" dirty="0" smtClean="0"/>
+              <a:t>Adaptive Encoding</a:t>
             </a:r>
             <a:endParaRPr lang="en-US" dirty="0"/>
-          </a:p>
-          <a:p>
-            <a:r>
-              <a:rPr lang="en-US" dirty="0"/>
-              <a:t>Huffman Encoder</a:t>
-            </a:r>
-          </a:p>
-          <a:p>
-            <a:r>
-              <a:rPr lang="en-US" smtClean="0"/>
-              <a:t>Serialization</a:t>
-            </a:r>
-            <a:endParaRPr lang="en-US"/>
           </a:p>
         </p:txBody>
       </p:sp>
@@ -6047,16 +6592,98 @@
           <a:p>
             <a:r>
               <a:rPr lang="en-US" dirty="0" smtClean="0"/>
-              <a:t>Summary</a:t>
+              <a:t>Huffman Encoder</a:t>
             </a:r>
             <a:endParaRPr lang="en-US" dirty="0"/>
           </a:p>
         </p:txBody>
       </p:sp>
+      <p:pic>
+        <p:nvPicPr>
+          <p:cNvPr id="4098" name="Picture 2" descr="C:\Users\Joshua Musick\workspace\Alg_Term_Project\data\analysis\stringsWav\Adaptive Huffman_Total Compression time (ms).png"/>
+          <p:cNvPicPr>
+            <a:picLocks noChangeAspect="1" noChangeArrowheads="1"/>
+          </p:cNvPicPr>
+          <p:nvPr/>
+        </p:nvPicPr>
+        <p:blipFill>
+          <a:blip r:embed="rId2">
+            <a:extLst>
+              <a:ext uri="{28A0092B-C50C-407E-A947-70E740481C1C}">
+                <a14:useLocalDpi xmlns:a14="http://schemas.microsoft.com/office/drawing/2010/main" val="0"/>
+              </a:ext>
+            </a:extLst>
+          </a:blip>
+          <a:srcRect/>
+          <a:stretch>
+            <a:fillRect/>
+          </a:stretch>
+        </p:blipFill>
+        <p:spPr bwMode="auto">
+          <a:xfrm>
+            <a:off x="324028" y="2469558"/>
+            <a:ext cx="4245429" cy="2971800"/>
+          </a:xfrm>
+          <a:prstGeom prst="rect">
+            <a:avLst/>
+          </a:prstGeom>
+          <a:noFill/>
+          <a:extLst>
+            <a:ext uri="{909E8E84-426E-40DD-AFC4-6F175D3DCCD1}">
+              <a14:hiddenFill xmlns:a14="http://schemas.microsoft.com/office/drawing/2010/main">
+                <a:solidFill>
+                  <a:srgbClr val="FFFFFF"/>
+                </a:solidFill>
+              </a14:hiddenFill>
+            </a:ext>
+          </a:extLst>
+        </p:spPr>
+      </p:pic>
+      <p:pic>
+        <p:nvPicPr>
+          <p:cNvPr id="4099" name="Picture 3" descr="C:\Users\Joshua Musick\workspace\Alg_Term_Project\data\analysis\stringsWav\Adaptive Huffman_Compression Ratio.png"/>
+          <p:cNvPicPr>
+            <a:picLocks noChangeAspect="1" noChangeArrowheads="1"/>
+          </p:cNvPicPr>
+          <p:nvPr/>
+        </p:nvPicPr>
+        <p:blipFill>
+          <a:blip r:embed="rId3">
+            <a:extLst>
+              <a:ext uri="{28A0092B-C50C-407E-A947-70E740481C1C}">
+                <a14:useLocalDpi xmlns:a14="http://schemas.microsoft.com/office/drawing/2010/main" val="0"/>
+              </a:ext>
+            </a:extLst>
+          </a:blip>
+          <a:srcRect/>
+          <a:stretch>
+            <a:fillRect/>
+          </a:stretch>
+        </p:blipFill>
+        <p:spPr bwMode="auto">
+          <a:xfrm>
+            <a:off x="4546770" y="2438401"/>
+            <a:ext cx="4427026" cy="3098918"/>
+          </a:xfrm>
+          <a:prstGeom prst="rect">
+            <a:avLst/>
+          </a:prstGeom>
+          <a:noFill/>
+          <a:extLst>
+            <a:ext uri="{909E8E84-426E-40DD-AFC4-6F175D3DCCD1}">
+              <a14:hiddenFill xmlns:a14="http://schemas.microsoft.com/office/drawing/2010/main">
+                <a:solidFill>
+                  <a:srgbClr val="FFFFFF"/>
+                </a:solidFill>
+              </a14:hiddenFill>
+            </a:ext>
+          </a:extLst>
+        </p:spPr>
+      </p:pic>
     </p:spTree>
     <p:extLst>
       <p:ext uri="{BB962C8B-B14F-4D97-AF65-F5344CB8AC3E}">
-        <p14:creationId xmlns:p14="http://schemas.microsoft.com/office/powerpoint/2010/main" val="1677742152"/>
+        <p14:creationId xmlns:p14="http://schemas.microsoft.com/office/powerpoint/2010/main" val="1424251591"/>
       </p:ext>
     </p:extLst>
   </p:cSld>

</xml_diff>

<commit_message>
Merged 2 presentations, kept Erics copy for comparison.
</commit_message>
<xml_diff>
--- a/report/JET Audio Encoder.pptx
+++ b/report/JET Audio Encoder.pptx
@@ -8,22 +8,18 @@
     <p:sldId id="256" r:id="rId2"/>
     <p:sldId id="258" r:id="rId3"/>
     <p:sldId id="257" r:id="rId4"/>
-    <p:sldId id="259" r:id="rId5"/>
-    <p:sldId id="260" r:id="rId6"/>
-    <p:sldId id="261" r:id="rId7"/>
-    <p:sldId id="262" r:id="rId8"/>
-    <p:sldId id="263" r:id="rId9"/>
-    <p:sldId id="265" r:id="rId10"/>
-    <p:sldId id="266" r:id="rId11"/>
-    <p:sldId id="267" r:id="rId12"/>
-    <p:sldId id="268" r:id="rId13"/>
-    <p:sldId id="271" r:id="rId14"/>
-    <p:sldId id="269" r:id="rId15"/>
-    <p:sldId id="273" r:id="rId16"/>
-    <p:sldId id="270" r:id="rId17"/>
-    <p:sldId id="272" r:id="rId18"/>
-    <p:sldId id="274" r:id="rId19"/>
-    <p:sldId id="264" r:id="rId20"/>
+    <p:sldId id="266" r:id="rId5"/>
+    <p:sldId id="267" r:id="rId6"/>
+    <p:sldId id="259" r:id="rId7"/>
+    <p:sldId id="265" r:id="rId8"/>
+    <p:sldId id="268" r:id="rId9"/>
+    <p:sldId id="269" r:id="rId10"/>
+    <p:sldId id="261" r:id="rId11"/>
+    <p:sldId id="270" r:id="rId12"/>
+    <p:sldId id="262" r:id="rId13"/>
+    <p:sldId id="263" r:id="rId14"/>
+    <p:sldId id="264" r:id="rId15"/>
+    <p:sldId id="271" r:id="rId16"/>
   </p:sldIdLst>
   <p:sldSz cx="9144000" cy="6858000" type="screen4x3"/>
   <p:notesSz cx="6858000" cy="9144000"/>
@@ -122,22 +118,6 @@
       </a:defRPr>
     </a:lvl9pPr>
   </p:defaultTextStyle>
-  <p:extLst>
-    <p:ext uri="{EFAFB233-063F-42B5-8137-9DF3F51BA10A}">
-      <p15:sldGuideLst xmlns:p15="http://schemas.microsoft.com/office/powerpoint/2012/main">
-        <p15:guide id="1" orient="horz" pos="2160">
-          <p15:clr>
-            <a:srgbClr val="A4A3A4"/>
-          </p15:clr>
-        </p15:guide>
-        <p15:guide id="2" pos="2880">
-          <p15:clr>
-            <a:srgbClr val="A4A3A4"/>
-          </p15:clr>
-        </p15:guide>
-      </p15:sldGuideLst>
-    </p:ext>
-  </p:extLst>
 </p:presentation>
 </file>
 
@@ -766,7 +746,7 @@
           <a:p>
             <a:fld id="{0687A9EE-9FDB-45A0-9CB2-30AFE7A6E960}" type="datetimeFigureOut">
               <a:rPr lang="en-US" smtClean="0"/>
-              <a:t>5/4/2017</a:t>
+              <a:t>5/5/2017</a:t>
             </a:fld>
             <a:endParaRPr lang="en-US"/>
           </a:p>
@@ -962,7 +942,7 @@
           <a:p>
             <a:fld id="{0687A9EE-9FDB-45A0-9CB2-30AFE7A6E960}" type="datetimeFigureOut">
               <a:rPr lang="en-US" smtClean="0"/>
-              <a:t>5/4/2017</a:t>
+              <a:t>5/5/2017</a:t>
             </a:fld>
             <a:endParaRPr lang="en-US"/>
           </a:p>
@@ -1147,7 +1127,7 @@
           <a:p>
             <a:fld id="{0687A9EE-9FDB-45A0-9CB2-30AFE7A6E960}" type="datetimeFigureOut">
               <a:rPr lang="en-US" smtClean="0"/>
-              <a:t>5/4/2017</a:t>
+              <a:t>5/5/2017</a:t>
             </a:fld>
             <a:endParaRPr lang="en-US"/>
           </a:p>
@@ -1297,7 +1277,7 @@
           <a:p>
             <a:fld id="{0687A9EE-9FDB-45A0-9CB2-30AFE7A6E960}" type="datetimeFigureOut">
               <a:rPr lang="en-US" smtClean="0"/>
-              <a:t>5/4/2017</a:t>
+              <a:t>5/5/2017</a:t>
             </a:fld>
             <a:endParaRPr lang="en-US"/>
           </a:p>
@@ -1552,7 +1532,7 @@
           <a:p>
             <a:fld id="{0687A9EE-9FDB-45A0-9CB2-30AFE7A6E960}" type="datetimeFigureOut">
               <a:rPr lang="en-US" smtClean="0"/>
-              <a:t>5/4/2017</a:t>
+              <a:t>5/5/2017</a:t>
             </a:fld>
             <a:endParaRPr lang="en-US"/>
           </a:p>
@@ -1961,7 +1941,7 @@
           <a:p>
             <a:fld id="{0687A9EE-9FDB-45A0-9CB2-30AFE7A6E960}" type="datetimeFigureOut">
               <a:rPr lang="en-US" smtClean="0"/>
-              <a:t>5/4/2017</a:t>
+              <a:t>5/5/2017</a:t>
             </a:fld>
             <a:endParaRPr lang="en-US"/>
           </a:p>
@@ -2407,7 +2387,7 @@
           <a:p>
             <a:fld id="{0687A9EE-9FDB-45A0-9CB2-30AFE7A6E960}" type="datetimeFigureOut">
               <a:rPr lang="en-US" smtClean="0"/>
-              <a:t>5/4/2017</a:t>
+              <a:t>5/5/2017</a:t>
             </a:fld>
             <a:endParaRPr lang="en-US"/>
           </a:p>
@@ -2508,7 +2488,7 @@
           <a:p>
             <a:fld id="{0687A9EE-9FDB-45A0-9CB2-30AFE7A6E960}" type="datetimeFigureOut">
               <a:rPr lang="en-US" smtClean="0"/>
-              <a:t>5/4/2017</a:t>
+              <a:t>5/5/2017</a:t>
             </a:fld>
             <a:endParaRPr lang="en-US"/>
           </a:p>
@@ -2629,7 +2609,7 @@
           <a:p>
             <a:fld id="{0687A9EE-9FDB-45A0-9CB2-30AFE7A6E960}" type="datetimeFigureOut">
               <a:rPr lang="en-US" smtClean="0"/>
-              <a:t>5/4/2017</a:t>
+              <a:t>5/5/2017</a:t>
             </a:fld>
             <a:endParaRPr lang="en-US"/>
           </a:p>
@@ -2903,7 +2883,7 @@
           <a:p>
             <a:fld id="{0687A9EE-9FDB-45A0-9CB2-30AFE7A6E960}" type="datetimeFigureOut">
               <a:rPr lang="en-US" smtClean="0"/>
-              <a:t>5/4/2017</a:t>
+              <a:t>5/5/2017</a:t>
             </a:fld>
             <a:endParaRPr lang="en-US"/>
           </a:p>
@@ -3108,7 +3088,7 @@
           <a:p>
             <a:fld id="{0687A9EE-9FDB-45A0-9CB2-30AFE7A6E960}" type="datetimeFigureOut">
               <a:rPr lang="en-US" smtClean="0"/>
-              <a:t>5/4/2017</a:t>
+              <a:t>5/5/2017</a:t>
             </a:fld>
             <a:endParaRPr lang="en-US"/>
           </a:p>
@@ -4217,7 +4197,7 @@
           <a:p>
             <a:fld id="{0687A9EE-9FDB-45A0-9CB2-30AFE7A6E960}" type="datetimeFigureOut">
               <a:rPr lang="en-US" smtClean="0"/>
-              <a:t>5/4/2017</a:t>
+              <a:t>5/5/2017</a:t>
             </a:fld>
             <a:endParaRPr lang="en-US"/>
           </a:p>
@@ -4700,13 +4680,6 @@
   <p:clrMapOvr>
     <a:masterClrMapping/>
   </p:clrMapOvr>
-  <p:timing>
-    <p:tnLst>
-      <p:par>
-        <p:cTn id="1" dur="indefinite" restart="never" nodeType="tmRoot"/>
-      </p:par>
-    </p:tnLst>
-  </p:timing>
 </p:sld>
 </file>
 
@@ -4744,44 +4717,24 @@
           <a:p>
             <a:r>
               <a:rPr lang="en-US" dirty="0" smtClean="0"/>
-              <a:t>We ran our compressor on nine wav files</a:t>
-            </a:r>
-          </a:p>
-          <a:p>
-            <a:endParaRPr lang="en-US" dirty="0" smtClean="0"/>
-          </a:p>
-          <a:p>
+              <a:t>Psycho-Acoustic </a:t>
+            </a:r>
             <a:r>
               <a:rPr lang="en-US" dirty="0" smtClean="0"/>
-              <a:t>Recorded metrics:</a:t>
-            </a:r>
-          </a:p>
-          <a:p>
-            <a:pPr lvl="1"/>
+              <a:t>Model</a:t>
+            </a:r>
+          </a:p>
+          <a:p>
             <a:r>
               <a:rPr lang="en-US" dirty="0" smtClean="0"/>
-              <a:t>Compression ratio</a:t>
-            </a:r>
-          </a:p>
-          <a:p>
-            <a:pPr lvl="1"/>
-            <a:r>
+              <a:t>Adaptive vs </a:t>
+            </a:r>
+            <a:br>
               <a:rPr lang="en-US" dirty="0" smtClean="0"/>
-              <a:t>RMS error</a:t>
-            </a:r>
-          </a:p>
-          <a:p>
-            <a:pPr lvl="1"/>
+            </a:br>
             <a:r>
               <a:rPr lang="en-US" dirty="0" smtClean="0"/>
-              <a:t>Compression time</a:t>
-            </a:r>
-          </a:p>
-          <a:p>
-            <a:pPr lvl="1"/>
-            <a:r>
-              <a:rPr lang="en-US" dirty="0" smtClean="0"/>
-              <a:t>Decompression time</a:t>
+              <a:t>Non-Adaptive</a:t>
             </a:r>
             <a:endParaRPr lang="en-US" dirty="0"/>
           </a:p>
@@ -4804,16 +4757,143 @@
           <a:p>
             <a:r>
               <a:rPr lang="en-US" dirty="0" smtClean="0"/>
-              <a:t>Results - Metrics</a:t>
+              <a:t>Byte </a:t>
+            </a:r>
+            <a:r>
+              <a:rPr lang="en-US" dirty="0" err="1" smtClean="0"/>
+              <a:t>Bufferizers</a:t>
             </a:r>
             <a:endParaRPr lang="en-US" dirty="0"/>
           </a:p>
         </p:txBody>
       </p:sp>
+      <p:pic>
+        <p:nvPicPr>
+          <p:cNvPr id="1026" name="Picture 2" descr="C:\Users\Joshua Musick\workspace\Alg_Term_Project\data\analysis\stringsWav\Adaptive Byte Buff_Compression Ratio.png"/>
+          <p:cNvPicPr>
+            <a:picLocks noChangeAspect="1" noChangeArrowheads="1"/>
+          </p:cNvPicPr>
+          <p:nvPr/>
+        </p:nvPicPr>
+        <p:blipFill>
+          <a:blip r:embed="rId2">
+            <a:extLst>
+              <a:ext uri="{28A0092B-C50C-407E-A947-70E740481C1C}">
+                <a14:useLocalDpi xmlns:a14="http://schemas.microsoft.com/office/drawing/2010/main" val="0"/>
+              </a:ext>
+            </a:extLst>
+          </a:blip>
+          <a:srcRect/>
+          <a:stretch>
+            <a:fillRect/>
+          </a:stretch>
+        </p:blipFill>
+        <p:spPr bwMode="auto">
+          <a:xfrm>
+            <a:off x="4891058" y="1066800"/>
+            <a:ext cx="3948143" cy="2400300"/>
+          </a:xfrm>
+          <a:prstGeom prst="rect">
+            <a:avLst/>
+          </a:prstGeom>
+          <a:noFill/>
+          <a:extLst>
+            <a:ext uri="{909E8E84-426E-40DD-AFC4-6F175D3DCCD1}">
+              <a14:hiddenFill xmlns:a14="http://schemas.microsoft.com/office/drawing/2010/main">
+                <a:solidFill>
+                  <a:srgbClr val="FFFFFF"/>
+                </a:solidFill>
+              </a14:hiddenFill>
+            </a:ext>
+          </a:extLst>
+        </p:spPr>
+      </p:pic>
+      <p:pic>
+        <p:nvPicPr>
+          <p:cNvPr id="1027" name="Picture 3" descr="C:\Users\Joshua Musick\workspace\Alg_Term_Project\data\analysis\stringsWav\Model f1_RMS Error.png"/>
+          <p:cNvPicPr>
+            <a:picLocks noChangeAspect="1" noChangeArrowheads="1"/>
+          </p:cNvPicPr>
+          <p:nvPr/>
+        </p:nvPicPr>
+        <p:blipFill>
+          <a:blip r:embed="rId3">
+            <a:extLst>
+              <a:ext uri="{28A0092B-C50C-407E-A947-70E740481C1C}">
+                <a14:useLocalDpi xmlns:a14="http://schemas.microsoft.com/office/drawing/2010/main" val="0"/>
+              </a:ext>
+            </a:extLst>
+          </a:blip>
+          <a:srcRect/>
+          <a:stretch>
+            <a:fillRect/>
+          </a:stretch>
+        </p:blipFill>
+        <p:spPr bwMode="auto">
+          <a:xfrm>
+            <a:off x="4891058" y="3477070"/>
+            <a:ext cx="3983038" cy="2788126"/>
+          </a:xfrm>
+          <a:prstGeom prst="rect">
+            <a:avLst/>
+          </a:prstGeom>
+          <a:noFill/>
+          <a:extLst>
+            <a:ext uri="{909E8E84-426E-40DD-AFC4-6F175D3DCCD1}">
+              <a14:hiddenFill xmlns:a14="http://schemas.microsoft.com/office/drawing/2010/main">
+                <a:solidFill>
+                  <a:srgbClr val="FFFFFF"/>
+                </a:solidFill>
+              </a14:hiddenFill>
+            </a:ext>
+          </a:extLst>
+        </p:spPr>
+      </p:pic>
+      <p:pic>
+        <p:nvPicPr>
+          <p:cNvPr id="1028" name="Picture 4" descr="C:\Users\Joshua Musick\workspace\Alg_Term_Project\data\analysis\stringsWav\Model f2_Compression Ratio.png"/>
+          <p:cNvPicPr>
+            <a:picLocks noChangeAspect="1" noChangeArrowheads="1"/>
+          </p:cNvPicPr>
+          <p:nvPr/>
+        </p:nvPicPr>
+        <p:blipFill>
+          <a:blip r:embed="rId4">
+            <a:extLst>
+              <a:ext uri="{28A0092B-C50C-407E-A947-70E740481C1C}">
+                <a14:useLocalDpi xmlns:a14="http://schemas.microsoft.com/office/drawing/2010/main" val="0"/>
+              </a:ext>
+            </a:extLst>
+          </a:blip>
+          <a:srcRect/>
+          <a:stretch>
+            <a:fillRect/>
+          </a:stretch>
+        </p:blipFill>
+        <p:spPr bwMode="auto">
+          <a:xfrm>
+            <a:off x="685800" y="3461966"/>
+            <a:ext cx="3982358" cy="2787650"/>
+          </a:xfrm>
+          <a:prstGeom prst="rect">
+            <a:avLst/>
+          </a:prstGeom>
+          <a:noFill/>
+          <a:extLst>
+            <a:ext uri="{909E8E84-426E-40DD-AFC4-6F175D3DCCD1}">
+              <a14:hiddenFill xmlns:a14="http://schemas.microsoft.com/office/drawing/2010/main">
+                <a:solidFill>
+                  <a:srgbClr val="FFFFFF"/>
+                </a:solidFill>
+              </a14:hiddenFill>
+            </a:ext>
+          </a:extLst>
+        </p:spPr>
+      </p:pic>
     </p:spTree>
     <p:extLst>
       <p:ext uri="{BB962C8B-B14F-4D97-AF65-F5344CB8AC3E}">
-        <p14:creationId xmlns:p14="http://schemas.microsoft.com/office/powerpoint/2010/main" val="106380655"/>
+        <p14:creationId xmlns:p14="http://schemas.microsoft.com/office/powerpoint/2010/main" val="1277048495"/>
       </p:ext>
     </p:extLst>
   </p:cSld>
@@ -4840,15 +4920,59 @@
           <a:chExt cx="0" cy="0"/>
         </a:xfrm>
       </p:grpSpPr>
+      <p:sp>
+        <p:nvSpPr>
+          <p:cNvPr id="2" name="Content Placeholder 1"/>
+          <p:cNvSpPr>
+            <a:spLocks noGrp="1"/>
+          </p:cNvSpPr>
+          <p:nvPr>
+            <p:ph idx="1"/>
+          </p:nvPr>
+        </p:nvSpPr>
+        <p:spPr/>
+        <p:txBody>
+          <a:bodyPr/>
+          <a:lstStyle/>
+          <a:p>
+            <a:endParaRPr lang="en-US"/>
+          </a:p>
+        </p:txBody>
+      </p:sp>
+      <p:sp>
+        <p:nvSpPr>
+          <p:cNvPr id="3" name="Title 2"/>
+          <p:cNvSpPr>
+            <a:spLocks noGrp="1"/>
+          </p:cNvSpPr>
+          <p:nvPr>
+            <p:ph type="title"/>
+          </p:nvPr>
+        </p:nvSpPr>
+        <p:spPr/>
+        <p:txBody>
+          <a:bodyPr/>
+          <a:lstStyle/>
+          <a:p>
+            <a:r>
+              <a:rPr lang="en-US" dirty="0" smtClean="0"/>
+              <a:t>Byte </a:t>
+            </a:r>
+            <a:r>
+              <a:rPr lang="en-US" dirty="0" err="1" smtClean="0"/>
+              <a:t>Bufferizers</a:t>
+            </a:r>
+            <a:endParaRPr lang="en-US" dirty="0"/>
+          </a:p>
+        </p:txBody>
+      </p:sp>
       <p:pic>
         <p:nvPicPr>
           <p:cNvPr id="4" name="Content Placeholder 3"/>
           <p:cNvPicPr>
-            <a:picLocks noGrp="1" noChangeAspect="1"/>
+            <a:picLocks noChangeAspect="1"/>
           </p:cNvPicPr>
-          <p:nvPr>
-            <p:ph idx="1"/>
-          </p:nvPr>
+          <p:nvPr/>
         </p:nvPicPr>
         <p:blipFill>
           <a:blip r:embed="rId2">
@@ -4867,35 +4991,15 @@
             <a:off x="457200" y="1528457"/>
             <a:ext cx="8229600" cy="4431323"/>
           </a:xfrm>
+          <a:prstGeom prst="rect">
+            <a:avLst/>
+          </a:prstGeom>
         </p:spPr>
       </p:pic>
-      <p:sp>
-        <p:nvSpPr>
-          <p:cNvPr id="3" name="Title 2"/>
-          <p:cNvSpPr>
-            <a:spLocks noGrp="1"/>
-          </p:cNvSpPr>
-          <p:nvPr>
-            <p:ph type="title"/>
-          </p:nvPr>
-        </p:nvSpPr>
-        <p:spPr/>
-        <p:txBody>
-          <a:bodyPr/>
-          <a:lstStyle/>
-          <a:p>
-            <a:r>
-              <a:rPr lang="en-US" dirty="0" smtClean="0"/>
-              <a:t>Results</a:t>
-            </a:r>
-            <a:endParaRPr lang="en-US" dirty="0"/>
-          </a:p>
-        </p:txBody>
-      </p:sp>
     </p:spTree>
     <p:extLst>
       <p:ext uri="{BB962C8B-B14F-4D97-AF65-F5344CB8AC3E}">
-        <p14:creationId xmlns:p14="http://schemas.microsoft.com/office/powerpoint/2010/main" val="469074451"/>
+        <p14:creationId xmlns:p14="http://schemas.microsoft.com/office/powerpoint/2010/main" val="2020332060"/>
       </p:ext>
     </p:extLst>
   </p:cSld>
@@ -4924,12 +5028,12 @@
       </p:grpSpPr>
       <p:sp>
         <p:nvSpPr>
-          <p:cNvPr id="3" name="Title 2"/>
-          <p:cNvSpPr>
-            <a:spLocks noGrp="1"/>
-          </p:cNvSpPr>
-          <p:nvPr>
-            <p:ph type="title"/>
+          <p:cNvPr id="2" name="Content Placeholder 1"/>
+          <p:cNvSpPr>
+            <a:spLocks noGrp="1"/>
+          </p:cNvSpPr>
+          <p:nvPr>
+            <p:ph idx="1"/>
           </p:nvPr>
         </p:nvSpPr>
         <p:spPr/>
@@ -4939,7 +5043,30 @@
           <a:p>
             <a:r>
               <a:rPr lang="en-US" dirty="0" smtClean="0"/>
-              <a:t>Results</a:t>
+              <a:t>Adaptive Encoding</a:t>
+            </a:r>
+            <a:endParaRPr lang="en-US" dirty="0"/>
+          </a:p>
+        </p:txBody>
+      </p:sp>
+      <p:sp>
+        <p:nvSpPr>
+          <p:cNvPr id="3" name="Title 2"/>
+          <p:cNvSpPr>
+            <a:spLocks noGrp="1"/>
+          </p:cNvSpPr>
+          <p:nvPr>
+            <p:ph type="title"/>
+          </p:nvPr>
+        </p:nvSpPr>
+        <p:spPr/>
+        <p:txBody>
+          <a:bodyPr/>
+          <a:lstStyle/>
+          <a:p>
+            <a:r>
+              <a:rPr lang="en-US" dirty="0" smtClean="0"/>
+              <a:t>Huffman Encoder</a:t>
             </a:r>
             <a:endParaRPr lang="en-US" dirty="0"/>
           </a:p>
@@ -4947,13 +5074,11 @@
       </p:sp>
       <p:pic>
         <p:nvPicPr>
-          <p:cNvPr id="6" name="Content Placeholder 5"/>
+          <p:cNvPr id="4098" name="Picture 2" descr="C:\Users\Joshua Musick\workspace\Alg_Term_Project\data\analysis\stringsWav\Adaptive Huffman_Total Compression time (ms).png"/>
           <p:cNvPicPr>
-            <a:picLocks noGrp="1" noChangeAspect="1"/>
+            <a:picLocks noChangeAspect="1" noChangeArrowheads="1"/>
           </p:cNvPicPr>
-          <p:nvPr>
-            <p:ph idx="1"/>
-          </p:nvPr>
+          <p:nvPr/>
         </p:nvPicPr>
         <p:blipFill>
           <a:blip r:embed="rId2">
@@ -4963,21 +5088,76 @@
               </a:ext>
             </a:extLst>
           </a:blip>
+          <a:srcRect/>
           <a:stretch>
             <a:fillRect/>
           </a:stretch>
         </p:blipFill>
-        <p:spPr>
+        <p:spPr bwMode="auto">
           <a:xfrm>
-            <a:off x="457200" y="1528457"/>
-            <a:ext cx="8229600" cy="4431323"/>
+            <a:off x="324028" y="2469558"/>
+            <a:ext cx="4245429" cy="2971800"/>
           </a:xfrm>
+          <a:prstGeom prst="rect">
+            <a:avLst/>
+          </a:prstGeom>
+          <a:noFill/>
+          <a:extLst>
+            <a:ext uri="{909E8E84-426E-40DD-AFC4-6F175D3DCCD1}">
+              <a14:hiddenFill xmlns:a14="http://schemas.microsoft.com/office/drawing/2010/main">
+                <a:solidFill>
+                  <a:srgbClr val="FFFFFF"/>
+                </a:solidFill>
+              </a14:hiddenFill>
+            </a:ext>
+          </a:extLst>
+        </p:spPr>
+      </p:pic>
+      <p:pic>
+        <p:nvPicPr>
+          <p:cNvPr id="4099" name="Picture 3" descr="C:\Users\Joshua Musick\workspace\Alg_Term_Project\data\analysis\stringsWav\Adaptive Huffman_Compression Ratio.png"/>
+          <p:cNvPicPr>
+            <a:picLocks noChangeAspect="1" noChangeArrowheads="1"/>
+          </p:cNvPicPr>
+          <p:nvPr/>
+        </p:nvPicPr>
+        <p:blipFill>
+          <a:blip r:embed="rId3">
+            <a:extLst>
+              <a:ext uri="{28A0092B-C50C-407E-A947-70E740481C1C}">
+                <a14:useLocalDpi xmlns:a14="http://schemas.microsoft.com/office/drawing/2010/main" val="0"/>
+              </a:ext>
+            </a:extLst>
+          </a:blip>
+          <a:srcRect/>
+          <a:stretch>
+            <a:fillRect/>
+          </a:stretch>
+        </p:blipFill>
+        <p:spPr bwMode="auto">
+          <a:xfrm>
+            <a:off x="4546770" y="2438401"/>
+            <a:ext cx="4427026" cy="3098918"/>
+          </a:xfrm>
+          <a:prstGeom prst="rect">
+            <a:avLst/>
+          </a:prstGeom>
+          <a:noFill/>
+          <a:extLst>
+            <a:ext uri="{909E8E84-426E-40DD-AFC4-6F175D3DCCD1}">
+              <a14:hiddenFill xmlns:a14="http://schemas.microsoft.com/office/drawing/2010/main">
+                <a:solidFill>
+                  <a:srgbClr val="FFFFFF"/>
+                </a:solidFill>
+              </a14:hiddenFill>
+            </a:ext>
+          </a:extLst>
         </p:spPr>
       </p:pic>
     </p:spTree>
     <p:extLst>
       <p:ext uri="{BB962C8B-B14F-4D97-AF65-F5344CB8AC3E}">
-        <p14:creationId xmlns:p14="http://schemas.microsoft.com/office/powerpoint/2010/main" val="903217941"/>
+        <p14:creationId xmlns:p14="http://schemas.microsoft.com/office/powerpoint/2010/main" val="1424251591"/>
       </p:ext>
     </p:extLst>
   </p:cSld>
@@ -5004,43 +5184,14 @@
           <a:chExt cx="0" cy="0"/>
         </a:xfrm>
       </p:grpSpPr>
-      <p:pic>
-        <p:nvPicPr>
-          <p:cNvPr id="4" name="Content Placeholder 3"/>
-          <p:cNvPicPr>
-            <a:picLocks noGrp="1" noChangeAspect="1"/>
-          </p:cNvPicPr>
+      <p:sp>
+        <p:nvSpPr>
+          <p:cNvPr id="2" name="Content Placeholder 1"/>
+          <p:cNvSpPr>
+            <a:spLocks noGrp="1"/>
+          </p:cNvSpPr>
           <p:nvPr>
             <p:ph idx="1"/>
-          </p:nvPr>
-        </p:nvPicPr>
-        <p:blipFill>
-          <a:blip r:embed="rId2">
-            <a:extLst>
-              <a:ext uri="{28A0092B-C50C-407E-A947-70E740481C1C}">
-                <a14:useLocalDpi xmlns:a14="http://schemas.microsoft.com/office/drawing/2010/main" val="0"/>
-              </a:ext>
-            </a:extLst>
-          </a:blip>
-          <a:stretch>
-            <a:fillRect/>
-          </a:stretch>
-        </p:blipFill>
-        <p:spPr>
-          <a:xfrm>
-            <a:off x="457200" y="1528457"/>
-            <a:ext cx="8229600" cy="4431323"/>
-          </a:xfrm>
-        </p:spPr>
-      </p:pic>
-      <p:sp>
-        <p:nvSpPr>
-          <p:cNvPr id="3" name="Title 2"/>
-          <p:cNvSpPr>
-            <a:spLocks noGrp="1"/>
-          </p:cNvSpPr>
-          <p:nvPr>
-            <p:ph type="title"/>
           </p:nvPr>
         </p:nvSpPr>
         <p:spPr/>
@@ -5050,7 +5201,42 @@
           <a:p>
             <a:r>
               <a:rPr lang="en-US" dirty="0" smtClean="0"/>
-              <a:t>Results</a:t>
+              <a:t>Writing data to binary file</a:t>
+            </a:r>
+          </a:p>
+          <a:p>
+            <a:r>
+              <a:rPr lang="en-US" dirty="0" smtClean="0"/>
+              <a:t>No standard format was used</a:t>
+            </a:r>
+          </a:p>
+          <a:p>
+            <a:r>
+              <a:rPr lang="en-US" dirty="0" smtClean="0"/>
+              <a:t>Enabled quick writing and reading</a:t>
+            </a:r>
+            <a:endParaRPr lang="en-US" dirty="0"/>
+          </a:p>
+        </p:txBody>
+      </p:sp>
+      <p:sp>
+        <p:nvSpPr>
+          <p:cNvPr id="3" name="Title 2"/>
+          <p:cNvSpPr>
+            <a:spLocks noGrp="1"/>
+          </p:cNvSpPr>
+          <p:nvPr>
+            <p:ph type="title"/>
+          </p:nvPr>
+        </p:nvSpPr>
+        <p:spPr/>
+        <p:txBody>
+          <a:bodyPr/>
+          <a:lstStyle/>
+          <a:p>
+            <a:r>
+              <a:rPr lang="en-US" dirty="0" smtClean="0"/>
+              <a:t>Data Serialization</a:t>
             </a:r>
             <a:endParaRPr lang="en-US" dirty="0"/>
           </a:p>
@@ -5059,7 +5245,7 @@
     </p:spTree>
     <p:extLst>
       <p:ext uri="{BB962C8B-B14F-4D97-AF65-F5344CB8AC3E}">
-        <p14:creationId xmlns:p14="http://schemas.microsoft.com/office/powerpoint/2010/main" val="3431187567"/>
+        <p14:creationId xmlns:p14="http://schemas.microsoft.com/office/powerpoint/2010/main" val="2879479575"/>
       </p:ext>
     </p:extLst>
   </p:cSld>
@@ -5086,43 +5272,14 @@
           <a:chExt cx="0" cy="0"/>
         </a:xfrm>
       </p:grpSpPr>
-      <p:pic>
-        <p:nvPicPr>
-          <p:cNvPr id="4" name="Content Placeholder 3"/>
-          <p:cNvPicPr>
-            <a:picLocks noGrp="1" noChangeAspect="1"/>
-          </p:cNvPicPr>
+      <p:sp>
+        <p:nvSpPr>
+          <p:cNvPr id="2" name="Content Placeholder 1"/>
+          <p:cNvSpPr>
+            <a:spLocks noGrp="1"/>
+          </p:cNvSpPr>
           <p:nvPr>
             <p:ph idx="1"/>
-          </p:nvPr>
-        </p:nvPicPr>
-        <p:blipFill>
-          <a:blip r:embed="rId2">
-            <a:extLst>
-              <a:ext uri="{28A0092B-C50C-407E-A947-70E740481C1C}">
-                <a14:useLocalDpi xmlns:a14="http://schemas.microsoft.com/office/drawing/2010/main" val="0"/>
-              </a:ext>
-            </a:extLst>
-          </a:blip>
-          <a:stretch>
-            <a:fillRect/>
-          </a:stretch>
-        </p:blipFill>
-        <p:spPr>
-          <a:xfrm>
-            <a:off x="457200" y="1528457"/>
-            <a:ext cx="8229600" cy="4431323"/>
-          </a:xfrm>
-        </p:spPr>
-      </p:pic>
-      <p:sp>
-        <p:nvSpPr>
-          <p:cNvPr id="3" name="Title 2"/>
-          <p:cNvSpPr>
-            <a:spLocks noGrp="1"/>
-          </p:cNvSpPr>
-          <p:nvPr>
-            <p:ph type="title"/>
           </p:nvPr>
         </p:nvSpPr>
         <p:spPr/>
@@ -5131,8 +5288,77 @@
           <a:lstStyle/>
           <a:p>
             <a:r>
+              <a:rPr lang="en-US" dirty="0"/>
+              <a:t>Compression </a:t>
+            </a:r>
+            <a:r>
               <a:rPr lang="en-US" dirty="0" smtClean="0"/>
-              <a:t>Results</a:t>
+              <a:t>Pipeline</a:t>
+            </a:r>
+          </a:p>
+          <a:p>
+            <a:r>
+              <a:rPr lang="en-US" dirty="0" smtClean="0"/>
+              <a:t>Metrics Evaluated</a:t>
+            </a:r>
+            <a:endParaRPr lang="en-US" dirty="0"/>
+          </a:p>
+          <a:p>
+            <a:r>
+              <a:rPr lang="en-US" dirty="0"/>
+              <a:t>Filter Bank</a:t>
+            </a:r>
+          </a:p>
+          <a:p>
+            <a:r>
+              <a:rPr lang="en-US" dirty="0"/>
+              <a:t>Modified Discrete Cosine Transform (MDCT)</a:t>
+            </a:r>
+          </a:p>
+          <a:p>
+            <a:r>
+              <a:rPr lang="en-US" dirty="0"/>
+              <a:t>Byte </a:t>
+            </a:r>
+            <a:r>
+              <a:rPr lang="en-US" dirty="0" err="1"/>
+              <a:t>Bufferizers</a:t>
+            </a:r>
+            <a:endParaRPr lang="en-US" dirty="0"/>
+          </a:p>
+          <a:p>
+            <a:r>
+              <a:rPr lang="en-US" dirty="0"/>
+              <a:t>Huffman Encoder</a:t>
+            </a:r>
+          </a:p>
+          <a:p>
+            <a:r>
+              <a:rPr lang="en-US" dirty="0" smtClean="0"/>
+              <a:t>Serialization</a:t>
+            </a:r>
+            <a:endParaRPr lang="en-US" dirty="0"/>
+          </a:p>
+        </p:txBody>
+      </p:sp>
+      <p:sp>
+        <p:nvSpPr>
+          <p:cNvPr id="3" name="Title 2"/>
+          <p:cNvSpPr>
+            <a:spLocks noGrp="1"/>
+          </p:cNvSpPr>
+          <p:nvPr>
+            <p:ph type="title"/>
+          </p:nvPr>
+        </p:nvSpPr>
+        <p:spPr/>
+        <p:txBody>
+          <a:bodyPr/>
+          <a:lstStyle/>
+          <a:p>
+            <a:r>
+              <a:rPr lang="en-US" dirty="0" smtClean="0"/>
+              <a:t>Summary</a:t>
             </a:r>
             <a:endParaRPr lang="en-US" dirty="0"/>
           </a:p>
@@ -5141,7 +5367,7 @@
     </p:spTree>
     <p:extLst>
       <p:ext uri="{BB962C8B-B14F-4D97-AF65-F5344CB8AC3E}">
-        <p14:creationId xmlns:p14="http://schemas.microsoft.com/office/powerpoint/2010/main" val="1839716245"/>
+        <p14:creationId xmlns:p14="http://schemas.microsoft.com/office/powerpoint/2010/main" val="1677742152"/>
       </p:ext>
     </p:extLst>
   </p:cSld>
@@ -5168,259 +5394,6 @@
           <a:chExt cx="0" cy="0"/>
         </a:xfrm>
       </p:grpSpPr>
-      <p:pic>
-        <p:nvPicPr>
-          <p:cNvPr id="4" name="Content Placeholder 3"/>
-          <p:cNvPicPr>
-            <a:picLocks noGrp="1" noChangeAspect="1"/>
-          </p:cNvPicPr>
-          <p:nvPr>
-            <p:ph idx="1"/>
-          </p:nvPr>
-        </p:nvPicPr>
-        <p:blipFill>
-          <a:blip r:embed="rId2">
-            <a:extLst>
-              <a:ext uri="{28A0092B-C50C-407E-A947-70E740481C1C}">
-                <a14:useLocalDpi xmlns:a14="http://schemas.microsoft.com/office/drawing/2010/main" val="0"/>
-              </a:ext>
-            </a:extLst>
-          </a:blip>
-          <a:stretch>
-            <a:fillRect/>
-          </a:stretch>
-        </p:blipFill>
-        <p:spPr>
-          <a:xfrm>
-            <a:off x="457200" y="1528457"/>
-            <a:ext cx="8229600" cy="4431323"/>
-          </a:xfrm>
-        </p:spPr>
-      </p:pic>
-      <p:sp>
-        <p:nvSpPr>
-          <p:cNvPr id="3" name="Title 2"/>
-          <p:cNvSpPr>
-            <a:spLocks noGrp="1"/>
-          </p:cNvSpPr>
-          <p:nvPr>
-            <p:ph type="title"/>
-          </p:nvPr>
-        </p:nvSpPr>
-        <p:spPr/>
-        <p:txBody>
-          <a:bodyPr/>
-          <a:lstStyle/>
-          <a:p>
-            <a:r>
-              <a:rPr lang="en-US" dirty="0" smtClean="0"/>
-              <a:t>Results</a:t>
-            </a:r>
-            <a:endParaRPr lang="en-US" dirty="0"/>
-          </a:p>
-        </p:txBody>
-      </p:sp>
-    </p:spTree>
-    <p:extLst>
-      <p:ext uri="{BB962C8B-B14F-4D97-AF65-F5344CB8AC3E}">
-        <p14:creationId xmlns:p14="http://schemas.microsoft.com/office/powerpoint/2010/main" val="603238326"/>
-      </p:ext>
-    </p:extLst>
-  </p:cSld>
-  <p:clrMapOvr>
-    <a:masterClrMapping/>
-  </p:clrMapOvr>
-</p:sld>
-</file>
-
-<file path=ppt/slides/slide16.xml><?xml version="1.0" encoding="utf-8"?>
-<p:sld xmlns:a="http://schemas.openxmlformats.org/drawingml/2006/main" xmlns:r="http://schemas.openxmlformats.org/officeDocument/2006/relationships" xmlns:p="http://schemas.openxmlformats.org/presentationml/2006/main">
-  <p:cSld>
-    <p:spTree>
-      <p:nvGrpSpPr>
-        <p:cNvPr id="1" name=""/>
-        <p:cNvGrpSpPr/>
-        <p:nvPr/>
-      </p:nvGrpSpPr>
-      <p:grpSpPr>
-        <a:xfrm>
-          <a:off x="0" y="0"/>
-          <a:ext cx="0" cy="0"/>
-          <a:chOff x="0" y="0"/>
-          <a:chExt cx="0" cy="0"/>
-        </a:xfrm>
-      </p:grpSpPr>
-      <p:pic>
-        <p:nvPicPr>
-          <p:cNvPr id="4" name="Content Placeholder 3"/>
-          <p:cNvPicPr>
-            <a:picLocks noGrp="1" noChangeAspect="1"/>
-          </p:cNvPicPr>
-          <p:nvPr>
-            <p:ph idx="1"/>
-          </p:nvPr>
-        </p:nvPicPr>
-        <p:blipFill>
-          <a:blip r:embed="rId2">
-            <a:extLst>
-              <a:ext uri="{28A0092B-C50C-407E-A947-70E740481C1C}">
-                <a14:useLocalDpi xmlns:a14="http://schemas.microsoft.com/office/drawing/2010/main" val="0"/>
-              </a:ext>
-            </a:extLst>
-          </a:blip>
-          <a:stretch>
-            <a:fillRect/>
-          </a:stretch>
-        </p:blipFill>
-        <p:spPr>
-          <a:xfrm>
-            <a:off x="457200" y="1528457"/>
-            <a:ext cx="8229600" cy="4431323"/>
-          </a:xfrm>
-        </p:spPr>
-      </p:pic>
-      <p:sp>
-        <p:nvSpPr>
-          <p:cNvPr id="3" name="Title 2"/>
-          <p:cNvSpPr>
-            <a:spLocks noGrp="1"/>
-          </p:cNvSpPr>
-          <p:nvPr>
-            <p:ph type="title"/>
-          </p:nvPr>
-        </p:nvSpPr>
-        <p:spPr/>
-        <p:txBody>
-          <a:bodyPr/>
-          <a:lstStyle/>
-          <a:p>
-            <a:r>
-              <a:rPr lang="en-US" dirty="0" smtClean="0"/>
-              <a:t>Results</a:t>
-            </a:r>
-            <a:endParaRPr lang="en-US" dirty="0"/>
-          </a:p>
-        </p:txBody>
-      </p:sp>
-    </p:spTree>
-    <p:extLst>
-      <p:ext uri="{BB962C8B-B14F-4D97-AF65-F5344CB8AC3E}">
-        <p14:creationId xmlns:p14="http://schemas.microsoft.com/office/powerpoint/2010/main" val="3148909582"/>
-      </p:ext>
-    </p:extLst>
-  </p:cSld>
-  <p:clrMapOvr>
-    <a:masterClrMapping/>
-  </p:clrMapOvr>
-</p:sld>
-</file>
-
-<file path=ppt/slides/slide17.xml><?xml version="1.0" encoding="utf-8"?>
-<p:sld xmlns:a="http://schemas.openxmlformats.org/drawingml/2006/main" xmlns:r="http://schemas.openxmlformats.org/officeDocument/2006/relationships" xmlns:p="http://schemas.openxmlformats.org/presentationml/2006/main">
-  <p:cSld>
-    <p:spTree>
-      <p:nvGrpSpPr>
-        <p:cNvPr id="1" name=""/>
-        <p:cNvGrpSpPr/>
-        <p:nvPr/>
-      </p:nvGrpSpPr>
-      <p:grpSpPr>
-        <a:xfrm>
-          <a:off x="0" y="0"/>
-          <a:ext cx="0" cy="0"/>
-          <a:chOff x="0" y="0"/>
-          <a:chExt cx="0" cy="0"/>
-        </a:xfrm>
-      </p:grpSpPr>
-      <p:sp>
-        <p:nvSpPr>
-          <p:cNvPr id="3" name="Title 2"/>
-          <p:cNvSpPr>
-            <a:spLocks noGrp="1"/>
-          </p:cNvSpPr>
-          <p:nvPr>
-            <p:ph type="title"/>
-          </p:nvPr>
-        </p:nvSpPr>
-        <p:spPr/>
-        <p:txBody>
-          <a:bodyPr/>
-          <a:lstStyle/>
-          <a:p>
-            <a:r>
-              <a:rPr lang="en-US" dirty="0" smtClean="0"/>
-              <a:t>Results</a:t>
-            </a:r>
-            <a:endParaRPr lang="en-US" dirty="0"/>
-          </a:p>
-        </p:txBody>
-      </p:sp>
-      <p:pic>
-        <p:nvPicPr>
-          <p:cNvPr id="5" name="Content Placeholder 4"/>
-          <p:cNvPicPr>
-            <a:picLocks noGrp="1" noChangeAspect="1"/>
-          </p:cNvPicPr>
-          <p:nvPr>
-            <p:ph idx="1"/>
-          </p:nvPr>
-        </p:nvPicPr>
-        <p:blipFill>
-          <a:blip r:embed="rId2">
-            <a:extLst>
-              <a:ext uri="{28A0092B-C50C-407E-A947-70E740481C1C}">
-                <a14:useLocalDpi xmlns:a14="http://schemas.microsoft.com/office/drawing/2010/main" val="0"/>
-              </a:ext>
-            </a:extLst>
-          </a:blip>
-          <a:stretch>
-            <a:fillRect/>
-          </a:stretch>
-        </p:blipFill>
-        <p:spPr>
-          <a:xfrm>
-            <a:off x="457200" y="1528457"/>
-            <a:ext cx="8229600" cy="4431323"/>
-          </a:xfrm>
-        </p:spPr>
-      </p:pic>
-    </p:spTree>
-    <p:extLst>
-      <p:ext uri="{BB962C8B-B14F-4D97-AF65-F5344CB8AC3E}">
-        <p14:creationId xmlns:p14="http://schemas.microsoft.com/office/powerpoint/2010/main" val="1331235137"/>
-      </p:ext>
-    </p:extLst>
-  </p:cSld>
-  <p:clrMapOvr>
-    <a:masterClrMapping/>
-  </p:clrMapOvr>
-  <p:timing>
-    <p:tnLst>
-      <p:par>
-        <p:cTn id="1" dur="indefinite" restart="never" nodeType="tmRoot"/>
-      </p:par>
-    </p:tnLst>
-  </p:timing>
-</p:sld>
-</file>
-
-<file path=ppt/slides/slide18.xml><?xml version="1.0" encoding="utf-8"?>
-<p:sld xmlns:a="http://schemas.openxmlformats.org/drawingml/2006/main" xmlns:r="http://schemas.openxmlformats.org/officeDocument/2006/relationships" xmlns:p="http://schemas.openxmlformats.org/presentationml/2006/main">
-  <p:cSld>
-    <p:spTree>
-      <p:nvGrpSpPr>
-        <p:cNvPr id="1" name=""/>
-        <p:cNvGrpSpPr/>
-        <p:nvPr/>
-      </p:nvGrpSpPr>
-      <p:grpSpPr>
-        <a:xfrm>
-          <a:off x="0" y="0"/>
-          <a:ext cx="0" cy="0"/>
-          <a:chOff x="0" y="0"/>
-          <a:chExt cx="0" cy="0"/>
-        </a:xfrm>
-      </p:grpSpPr>
       <p:sp>
         <p:nvSpPr>
           <p:cNvPr id="2" name="Content Placeholder 1"/>
@@ -5484,7 +5457,6 @@
               <a:rPr lang="en-US" dirty="0" smtClean="0"/>
               <a:t>(0.037, 0.2, 192ms)</a:t>
             </a:r>
-            <a:endParaRPr lang="en-US" dirty="0" smtClean="0"/>
           </a:p>
           <a:p>
             <a:endParaRPr lang="en-US" dirty="0"/>
@@ -5534,137 +5506,7 @@
     </p:spTree>
     <p:extLst>
       <p:ext uri="{BB962C8B-B14F-4D97-AF65-F5344CB8AC3E}">
-        <p14:creationId xmlns:p14="http://schemas.microsoft.com/office/powerpoint/2010/main" val="2627277593"/>
-      </p:ext>
-    </p:extLst>
-  </p:cSld>
-  <p:clrMapOvr>
-    <a:masterClrMapping/>
-  </p:clrMapOvr>
-  <p:timing>
-    <p:tnLst>
-      <p:par>
-        <p:cTn id="1" dur="indefinite" restart="never" nodeType="tmRoot"/>
-      </p:par>
-    </p:tnLst>
-  </p:timing>
-</p:sld>
-</file>
-
-<file path=ppt/slides/slide19.xml><?xml version="1.0" encoding="utf-8"?>
-<p:sld xmlns:a="http://schemas.openxmlformats.org/drawingml/2006/main" xmlns:r="http://schemas.openxmlformats.org/officeDocument/2006/relationships" xmlns:p="http://schemas.openxmlformats.org/presentationml/2006/main">
-  <p:cSld>
-    <p:spTree>
-      <p:nvGrpSpPr>
-        <p:cNvPr id="1" name=""/>
-        <p:cNvGrpSpPr/>
-        <p:nvPr/>
-      </p:nvGrpSpPr>
-      <p:grpSpPr>
-        <a:xfrm>
-          <a:off x="0" y="0"/>
-          <a:ext cx="0" cy="0"/>
-          <a:chOff x="0" y="0"/>
-          <a:chExt cx="0" cy="0"/>
-        </a:xfrm>
-      </p:grpSpPr>
-      <p:sp>
-        <p:nvSpPr>
-          <p:cNvPr id="2" name="Content Placeholder 1"/>
-          <p:cNvSpPr>
-            <a:spLocks noGrp="1"/>
-          </p:cNvSpPr>
-          <p:nvPr>
-            <p:ph idx="1"/>
-          </p:nvPr>
-        </p:nvSpPr>
-        <p:spPr/>
-        <p:txBody>
-          <a:bodyPr/>
-          <a:lstStyle/>
-          <a:p>
-            <a:r>
-              <a:rPr lang="en-US" dirty="0"/>
-              <a:t>Compression Pipeline</a:t>
-            </a:r>
-          </a:p>
-          <a:p>
-            <a:r>
-              <a:rPr lang="en-US" dirty="0"/>
-              <a:t>Filter Bank</a:t>
-            </a:r>
-          </a:p>
-          <a:p>
-            <a:r>
-              <a:rPr lang="en-US" dirty="0"/>
-              <a:t>Modified Discrete Cosine Transform (MDCT)</a:t>
-            </a:r>
-          </a:p>
-          <a:p>
-            <a:r>
-              <a:rPr lang="en-US" dirty="0"/>
-              <a:t>Byte </a:t>
-            </a:r>
-            <a:r>
-              <a:rPr lang="en-US" dirty="0" err="1"/>
-              <a:t>Bufferizers</a:t>
-            </a:r>
-            <a:endParaRPr lang="en-US" dirty="0"/>
-          </a:p>
-          <a:p>
-            <a:r>
-              <a:rPr lang="en-US" dirty="0"/>
-              <a:t>Huffman Encoder</a:t>
-            </a:r>
-          </a:p>
-          <a:p>
-            <a:r>
-              <a:rPr lang="en-US" dirty="0" smtClean="0"/>
-              <a:t>Serialization</a:t>
-            </a:r>
-          </a:p>
-          <a:p>
-            <a:r>
-              <a:rPr lang="en-US" dirty="0" smtClean="0"/>
-              <a:t>Results</a:t>
-            </a:r>
-          </a:p>
-          <a:p>
-            <a:r>
-              <a:rPr lang="en-US" dirty="0" smtClean="0"/>
-              <a:t>Audio Samples</a:t>
-            </a:r>
-            <a:endParaRPr lang="en-US" dirty="0"/>
-          </a:p>
-        </p:txBody>
-      </p:sp>
-      <p:sp>
-        <p:nvSpPr>
-          <p:cNvPr id="3" name="Title 2"/>
-          <p:cNvSpPr>
-            <a:spLocks noGrp="1"/>
-          </p:cNvSpPr>
-          <p:nvPr>
-            <p:ph type="title"/>
-          </p:nvPr>
-        </p:nvSpPr>
-        <p:spPr/>
-        <p:txBody>
-          <a:bodyPr/>
-          <a:lstStyle/>
-          <a:p>
-            <a:r>
-              <a:rPr lang="en-US" dirty="0" smtClean="0"/>
-              <a:t>Summary</a:t>
-            </a:r>
-            <a:endParaRPr lang="en-US" dirty="0"/>
-          </a:p>
-        </p:txBody>
-      </p:sp>
-    </p:spTree>
-    <p:extLst>
-      <p:ext uri="{BB962C8B-B14F-4D97-AF65-F5344CB8AC3E}">
-        <p14:creationId xmlns:p14="http://schemas.microsoft.com/office/powerpoint/2010/main" val="1677742152"/>
+        <p14:creationId xmlns:p14="http://schemas.microsoft.com/office/powerpoint/2010/main" val="3903124468"/>
       </p:ext>
     </p:extLst>
   </p:cSld>
@@ -5721,6 +5563,12 @@
           <a:p>
             <a:r>
               <a:rPr lang="en-US" dirty="0" smtClean="0"/>
+              <a:t>Metrics Evaluated</a:t>
+            </a:r>
+          </a:p>
+          <a:p>
+            <a:r>
+              <a:rPr lang="en-US" dirty="0" smtClean="0"/>
               <a:t>Filter Bank</a:t>
             </a:r>
           </a:p>
@@ -5760,20 +5608,6 @@
               <a:rPr lang="en-US" dirty="0" smtClean="0"/>
               <a:t>Serialization</a:t>
             </a:r>
-          </a:p>
-          <a:p>
-            <a:r>
-              <a:rPr lang="en-US" dirty="0" smtClean="0"/>
-              <a:t>Results</a:t>
-            </a:r>
-          </a:p>
-          <a:p>
-            <a:r>
-              <a:rPr lang="en-US" dirty="0"/>
-              <a:t>Audio Samples</a:t>
-            </a:r>
-          </a:p>
-          <a:p>
             <a:endParaRPr lang="en-US" dirty="0"/>
           </a:p>
         </p:txBody>
@@ -5813,13 +5647,6 @@
   <p:clrMapOvr>
     <a:masterClrMapping/>
   </p:clrMapOvr>
-  <p:timing>
-    <p:tnLst>
-      <p:par>
-        <p:cTn id="1" dur="indefinite" restart="never" nodeType="tmRoot"/>
-      </p:par>
-    </p:tnLst>
-  </p:timing>
 </p:sld>
 </file>
 
@@ -5855,7 +5682,6 @@
           <a:bodyPr/>
           <a:lstStyle/>
           <a:p>
-            <a:pPr algn="ctr"/>
             <a:r>
               <a:rPr lang="en-US" dirty="0" smtClean="0"/>
               <a:t>Audio Compression Pipeline</a:t>
@@ -6556,6 +6382,106 @@
           <a:chExt cx="0" cy="0"/>
         </a:xfrm>
       </p:grpSpPr>
+      <p:sp>
+        <p:nvSpPr>
+          <p:cNvPr id="2" name="Content Placeholder 1"/>
+          <p:cNvSpPr>
+            <a:spLocks noGrp="1"/>
+          </p:cNvSpPr>
+          <p:nvPr>
+            <p:ph idx="1"/>
+          </p:nvPr>
+        </p:nvSpPr>
+        <p:spPr/>
+        <p:txBody>
+          <a:bodyPr/>
+          <a:lstStyle/>
+          <a:p>
+            <a:r>
+              <a:rPr lang="en-US" dirty="0" smtClean="0"/>
+              <a:t>Compress / Decompress Time </a:t>
+            </a:r>
+          </a:p>
+          <a:p>
+            <a:r>
+              <a:rPr lang="en-US" dirty="0" smtClean="0"/>
+              <a:t>Compression Ratio </a:t>
+            </a:r>
+            <a:br>
+              <a:rPr lang="en-US" dirty="0" smtClean="0"/>
+            </a:br>
+            <a:r>
+              <a:rPr lang="en-US" dirty="0" smtClean="0"/>
+              <a:t>(input size vs output size)</a:t>
+            </a:r>
+          </a:p>
+          <a:p>
+            <a:r>
+              <a:rPr lang="en-US" dirty="0" smtClean="0"/>
+              <a:t>RMS Error</a:t>
+            </a:r>
+          </a:p>
+          <a:p>
+            <a:endParaRPr lang="en-US" dirty="0" smtClean="0"/>
+          </a:p>
+          <a:p>
+            <a:endParaRPr lang="en-US" dirty="0"/>
+          </a:p>
+        </p:txBody>
+      </p:sp>
+      <p:sp>
+        <p:nvSpPr>
+          <p:cNvPr id="3" name="Title 2"/>
+          <p:cNvSpPr>
+            <a:spLocks noGrp="1"/>
+          </p:cNvSpPr>
+          <p:nvPr>
+            <p:ph type="title"/>
+          </p:nvPr>
+        </p:nvSpPr>
+        <p:spPr/>
+        <p:txBody>
+          <a:bodyPr/>
+          <a:lstStyle/>
+          <a:p>
+            <a:r>
+              <a:rPr lang="en-US" dirty="0" smtClean="0"/>
+              <a:t>Metrics Evaluated</a:t>
+            </a:r>
+            <a:endParaRPr lang="en-US" dirty="0"/>
+          </a:p>
+        </p:txBody>
+      </p:sp>
+    </p:spTree>
+    <p:extLst>
+      <p:ext uri="{BB962C8B-B14F-4D97-AF65-F5344CB8AC3E}">
+        <p14:creationId xmlns:p14="http://schemas.microsoft.com/office/powerpoint/2010/main" val="4213318400"/>
+      </p:ext>
+    </p:extLst>
+  </p:cSld>
+  <p:clrMapOvr>
+    <a:masterClrMapping/>
+  </p:clrMapOvr>
+</p:sld>
+</file>
+
+<file path=ppt/slides/slide5.xml><?xml version="1.0" encoding="utf-8"?>
+<p:sld xmlns:a="http://schemas.openxmlformats.org/drawingml/2006/main" xmlns:r="http://schemas.openxmlformats.org/officeDocument/2006/relationships" xmlns:p="http://schemas.openxmlformats.org/presentationml/2006/main">
+  <p:cSld>
+    <p:spTree>
+      <p:nvGrpSpPr>
+        <p:cNvPr id="1" name=""/>
+        <p:cNvGrpSpPr/>
+        <p:nvPr/>
+      </p:nvGrpSpPr>
+      <p:grpSpPr>
+        <a:xfrm>
+          <a:off x="0" y="0"/>
+          <a:ext cx="0" cy="0"/>
+          <a:chOff x="0" y="0"/>
+          <a:chExt cx="0" cy="0"/>
+        </a:xfrm>
+      </p:grpSpPr>
       <mc:AlternateContent xmlns:mc="http://schemas.openxmlformats.org/markup-compatibility/2006" xmlns:a14="http://schemas.microsoft.com/office/drawing/2010/main">
         <mc:Choice Requires="a14">
           <p:sp>
@@ -6597,7 +6523,7 @@
                       <m:dPr>
                         <m:ctrlPr>
                           <a:rPr lang="en-US" i="1">
-                            <a:latin typeface="Cambria Math" panose="02040503050406030204" pitchFamily="18" charset="0"/>
+                            <a:latin typeface="Cambria Math"/>
                           </a:rPr>
                         </m:ctrlPr>
                       </m:dPr>
@@ -6606,7 +6532,7 @@
                           <m:fPr>
                             <m:ctrlPr>
                               <a:rPr lang="en-US" i="1">
-                                <a:latin typeface="Cambria Math" panose="02040503050406030204" pitchFamily="18" charset="0"/>
+                                <a:latin typeface="Cambria Math"/>
                               </a:rPr>
                             </m:ctrlPr>
                           </m:fPr>
@@ -6615,7 +6541,7 @@
                               <m:sSubSupPr>
                                 <m:ctrlPr>
                                   <a:rPr lang="en-US" i="1">
-                                    <a:latin typeface="Cambria Math" panose="02040503050406030204" pitchFamily="18" charset="0"/>
+                                    <a:latin typeface="Cambria Math"/>
                                   </a:rPr>
                                 </m:ctrlPr>
                               </m:sSubSupPr>
@@ -6650,7 +6576,7 @@
                               <m:sSubPr>
                                 <m:ctrlPr>
                                   <a:rPr lang="en-US" i="1">
-                                    <a:latin typeface="Cambria Math" panose="02040503050406030204" pitchFamily="18" charset="0"/>
+                                    <a:latin typeface="Cambria Math"/>
                                   </a:rPr>
                                 </m:ctrlPr>
                               </m:sSubPr>
@@ -6659,7 +6585,7 @@
                                   <m:sSubPr>
                                     <m:ctrlPr>
                                       <a:rPr lang="en-US" i="1">
-                                        <a:latin typeface="Cambria Math" panose="02040503050406030204" pitchFamily="18" charset="0"/>
+                                        <a:latin typeface="Cambria Math"/>
                                       </a:rPr>
                                     </m:ctrlPr>
                                   </m:sSubPr>
@@ -6822,6 +6748,225 @@
     </p:spTree>
     <p:extLst>
       <p:ext uri="{BB962C8B-B14F-4D97-AF65-F5344CB8AC3E}">
+        <p14:creationId xmlns:p14="http://schemas.microsoft.com/office/powerpoint/2010/main" val="306897016"/>
+      </p:ext>
+    </p:extLst>
+  </p:cSld>
+  <p:clrMapOvr>
+    <a:masterClrMapping/>
+  </p:clrMapOvr>
+</p:sld>
+</file>
+
+<file path=ppt/slides/slide6.xml><?xml version="1.0" encoding="utf-8"?>
+<p:sld xmlns:a="http://schemas.openxmlformats.org/drawingml/2006/main" xmlns:r="http://schemas.openxmlformats.org/officeDocument/2006/relationships" xmlns:p="http://schemas.openxmlformats.org/presentationml/2006/main">
+  <p:cSld>
+    <p:spTree>
+      <p:nvGrpSpPr>
+        <p:cNvPr id="1" name=""/>
+        <p:cNvGrpSpPr/>
+        <p:nvPr/>
+      </p:nvGrpSpPr>
+      <p:grpSpPr>
+        <a:xfrm>
+          <a:off x="0" y="0"/>
+          <a:ext cx="0" cy="0"/>
+          <a:chOff x="0" y="0"/>
+          <a:chExt cx="0" cy="0"/>
+        </a:xfrm>
+      </p:grpSpPr>
+      <p:sp>
+        <p:nvSpPr>
+          <p:cNvPr id="2" name="Content Placeholder 1"/>
+          <p:cNvSpPr>
+            <a:spLocks noGrp="1"/>
+          </p:cNvSpPr>
+          <p:nvPr>
+            <p:ph idx="1"/>
+          </p:nvPr>
+        </p:nvSpPr>
+        <p:spPr/>
+        <p:txBody>
+          <a:bodyPr>
+            <a:normAutofit/>
+          </a:bodyPr>
+          <a:lstStyle/>
+          <a:p>
+            <a:r>
+              <a:rPr lang="en-US" sz="2800" dirty="0" smtClean="0"/>
+              <a:t>Variable Parameters</a:t>
+            </a:r>
+          </a:p>
+          <a:p>
+            <a:pPr lvl="1"/>
+            <a:r>
+              <a:rPr lang="en-US" sz="2400" dirty="0" smtClean="0"/>
+              <a:t>Filter Bank </a:t>
+            </a:r>
+            <a:r>
+              <a:rPr lang="en-US" sz="2400" dirty="0" smtClean="0"/>
+              <a:t>Length</a:t>
+            </a:r>
+          </a:p>
+          <a:p>
+            <a:pPr lvl="1"/>
+            <a:r>
+              <a:rPr lang="en-US" sz="2400" dirty="0" smtClean="0"/>
+              <a:t>Number of Sub-bands</a:t>
+            </a:r>
+            <a:endParaRPr lang="en-US" sz="2400" dirty="0"/>
+          </a:p>
+        </p:txBody>
+      </p:sp>
+      <p:sp>
+        <p:nvSpPr>
+          <p:cNvPr id="3" name="Title 2"/>
+          <p:cNvSpPr>
+            <a:spLocks noGrp="1"/>
+          </p:cNvSpPr>
+          <p:nvPr>
+            <p:ph type="title"/>
+          </p:nvPr>
+        </p:nvSpPr>
+        <p:spPr/>
+        <p:txBody>
+          <a:bodyPr/>
+          <a:lstStyle/>
+          <a:p>
+            <a:r>
+              <a:rPr lang="en-US" dirty="0" smtClean="0"/>
+              <a:t>Filter Bank Step</a:t>
+            </a:r>
+            <a:endParaRPr lang="en-US" dirty="0"/>
+          </a:p>
+        </p:txBody>
+      </p:sp>
+      <p:pic>
+        <p:nvPicPr>
+          <p:cNvPr id="2050" name="Picture 2" descr="C:\Users\Joshua Musick\workspace\Alg_Term_Project\data\analysis\stringsWav\FilterBank Length_RMS Error.png"/>
+          <p:cNvPicPr>
+            <a:picLocks noChangeAspect="1" noChangeArrowheads="1"/>
+          </p:cNvPicPr>
+          <p:nvPr/>
+        </p:nvPicPr>
+        <p:blipFill>
+          <a:blip r:embed="rId2">
+            <a:extLst>
+              <a:ext uri="{28A0092B-C50C-407E-A947-70E740481C1C}">
+                <a14:useLocalDpi xmlns:a14="http://schemas.microsoft.com/office/drawing/2010/main" val="0"/>
+              </a:ext>
+            </a:extLst>
+          </a:blip>
+          <a:srcRect/>
+          <a:stretch>
+            <a:fillRect/>
+          </a:stretch>
+        </p:blipFill>
+        <p:spPr bwMode="auto">
+          <a:xfrm>
+            <a:off x="4889273" y="246062"/>
+            <a:ext cx="4111626" cy="2878138"/>
+          </a:xfrm>
+          <a:prstGeom prst="rect">
+            <a:avLst/>
+          </a:prstGeom>
+          <a:noFill/>
+          <a:extLst>
+            <a:ext uri="{909E8E84-426E-40DD-AFC4-6F175D3DCCD1}">
+              <a14:hiddenFill xmlns:a14="http://schemas.microsoft.com/office/drawing/2010/main">
+                <a:solidFill>
+                  <a:srgbClr val="FFFFFF"/>
+                </a:solidFill>
+              </a14:hiddenFill>
+            </a:ext>
+          </a:extLst>
+        </p:spPr>
+      </p:pic>
+      <p:pic>
+        <p:nvPicPr>
+          <p:cNvPr id="2051" name="Picture 3" descr="C:\Users\Joshua Musick\workspace\Alg_Term_Project\data\analysis\stringsWav\FilterBank Num SubBands _Total Compression time (ms).png"/>
+          <p:cNvPicPr>
+            <a:picLocks noChangeAspect="1" noChangeArrowheads="1"/>
+          </p:cNvPicPr>
+          <p:nvPr/>
+        </p:nvPicPr>
+        <p:blipFill>
+          <a:blip r:embed="rId3">
+            <a:extLst>
+              <a:ext uri="{28A0092B-C50C-407E-A947-70E740481C1C}">
+                <a14:useLocalDpi xmlns:a14="http://schemas.microsoft.com/office/drawing/2010/main" val="0"/>
+              </a:ext>
+            </a:extLst>
+          </a:blip>
+          <a:srcRect/>
+          <a:stretch>
+            <a:fillRect/>
+          </a:stretch>
+        </p:blipFill>
+        <p:spPr bwMode="auto">
+          <a:xfrm>
+            <a:off x="4864327" y="3124200"/>
+            <a:ext cx="4136572" cy="2895600"/>
+          </a:xfrm>
+          <a:prstGeom prst="rect">
+            <a:avLst/>
+          </a:prstGeom>
+          <a:noFill/>
+          <a:extLst>
+            <a:ext uri="{909E8E84-426E-40DD-AFC4-6F175D3DCCD1}">
+              <a14:hiddenFill xmlns:a14="http://schemas.microsoft.com/office/drawing/2010/main">
+                <a:solidFill>
+                  <a:srgbClr val="FFFFFF"/>
+                </a:solidFill>
+              </a14:hiddenFill>
+            </a:ext>
+          </a:extLst>
+        </p:spPr>
+      </p:pic>
+      <p:pic>
+        <p:nvPicPr>
+          <p:cNvPr id="2052" name="Picture 4" descr="C:\Users\Joshua Musick\workspace\Alg_Term_Project\data\analysis\stringsWav\FilterBank Num SubBands _Compression Ratio.png"/>
+          <p:cNvPicPr>
+            <a:picLocks noChangeAspect="1" noChangeArrowheads="1"/>
+          </p:cNvPicPr>
+          <p:nvPr/>
+        </p:nvPicPr>
+        <p:blipFill>
+          <a:blip r:embed="rId4">
+            <a:extLst>
+              <a:ext uri="{28A0092B-C50C-407E-A947-70E740481C1C}">
+                <a14:useLocalDpi xmlns:a14="http://schemas.microsoft.com/office/drawing/2010/main" val="0"/>
+              </a:ext>
+            </a:extLst>
+          </a:blip>
+          <a:srcRect/>
+          <a:stretch>
+            <a:fillRect/>
+          </a:stretch>
+        </p:blipFill>
+        <p:spPr bwMode="auto">
+          <a:xfrm>
+            <a:off x="811668" y="3124200"/>
+            <a:ext cx="4052659" cy="2836862"/>
+          </a:xfrm>
+          <a:prstGeom prst="rect">
+            <a:avLst/>
+          </a:prstGeom>
+          <a:noFill/>
+          <a:extLst>
+            <a:ext uri="{909E8E84-426E-40DD-AFC4-6F175D3DCCD1}">
+              <a14:hiddenFill xmlns:a14="http://schemas.microsoft.com/office/drawing/2010/main">
+                <a:solidFill>
+                  <a:srgbClr val="FFFFFF"/>
+                </a:solidFill>
+              </a14:hiddenFill>
+            </a:ext>
+          </a:extLst>
+        </p:spPr>
+      </p:pic>
+    </p:spTree>
+    <p:extLst>
+      <p:ext uri="{BB962C8B-B14F-4D97-AF65-F5344CB8AC3E}">
         <p14:creationId xmlns:p14="http://schemas.microsoft.com/office/powerpoint/2010/main" val="3820966249"/>
       </p:ext>
     </p:extLst>
@@ -6832,7 +6977,206 @@
 </p:sld>
 </file>
 
-<file path=ppt/slides/slide5.xml><?xml version="1.0" encoding="utf-8"?>
+<file path=ppt/slides/slide7.xml><?xml version="1.0" encoding="utf-8"?>
+<p:sld xmlns:a="http://schemas.openxmlformats.org/drawingml/2006/main" xmlns:r="http://schemas.openxmlformats.org/officeDocument/2006/relationships" xmlns:p="http://schemas.openxmlformats.org/presentationml/2006/main">
+  <p:cSld>
+    <p:spTree>
+      <p:nvGrpSpPr>
+        <p:cNvPr id="1" name=""/>
+        <p:cNvGrpSpPr/>
+        <p:nvPr/>
+      </p:nvGrpSpPr>
+      <p:grpSpPr>
+        <a:xfrm>
+          <a:off x="0" y="0"/>
+          <a:ext cx="0" cy="0"/>
+          <a:chOff x="0" y="0"/>
+          <a:chExt cx="0" cy="0"/>
+        </a:xfrm>
+      </p:grpSpPr>
+      <p:sp>
+        <p:nvSpPr>
+          <p:cNvPr id="2" name="Content Placeholder 1"/>
+          <p:cNvSpPr>
+            <a:spLocks noGrp="1"/>
+          </p:cNvSpPr>
+          <p:nvPr>
+            <p:ph idx="1"/>
+          </p:nvPr>
+        </p:nvSpPr>
+        <p:spPr/>
+        <p:txBody>
+          <a:bodyPr/>
+          <a:lstStyle/>
+          <a:p>
+            <a:r>
+              <a:rPr lang="en-US" dirty="0" smtClean="0"/>
+              <a:t>Variable Parameters</a:t>
+            </a:r>
+          </a:p>
+          <a:p>
+            <a:pPr lvl="1"/>
+            <a:r>
+              <a:rPr lang="en-US" dirty="0" smtClean="0"/>
+              <a:t>Window Length</a:t>
+            </a:r>
+            <a:endParaRPr lang="en-US" dirty="0"/>
+          </a:p>
+        </p:txBody>
+      </p:sp>
+      <p:sp>
+        <p:nvSpPr>
+          <p:cNvPr id="3" name="Title 2"/>
+          <p:cNvSpPr>
+            <a:spLocks noGrp="1"/>
+          </p:cNvSpPr>
+          <p:nvPr>
+            <p:ph type="title"/>
+          </p:nvPr>
+        </p:nvSpPr>
+        <p:spPr/>
+        <p:txBody>
+          <a:bodyPr/>
+          <a:lstStyle/>
+          <a:p>
+            <a:r>
+              <a:rPr lang="en-US" dirty="0" smtClean="0"/>
+              <a:t>Filter Bank </a:t>
+            </a:r>
+            <a:r>
+              <a:rPr lang="en-US" dirty="0" smtClean="0"/>
+              <a:t>Step</a:t>
+            </a:r>
+            <a:endParaRPr lang="en-US" dirty="0"/>
+          </a:p>
+        </p:txBody>
+      </p:sp>
+      <p:pic>
+        <p:nvPicPr>
+          <p:cNvPr id="3074" name="Picture 2" descr="C:\Users\Joshua Musick\workspace\Alg_Term_Project\data\analysis\stringsWav\Window Length_Total Compression time (ms).png"/>
+          <p:cNvPicPr>
+            <a:picLocks noChangeAspect="1" noChangeArrowheads="1"/>
+          </p:cNvPicPr>
+          <p:nvPr/>
+        </p:nvPicPr>
+        <p:blipFill>
+          <a:blip r:embed="rId2">
+            <a:extLst>
+              <a:ext uri="{28A0092B-C50C-407E-A947-70E740481C1C}">
+                <a14:useLocalDpi xmlns:a14="http://schemas.microsoft.com/office/drawing/2010/main" val="0"/>
+              </a:ext>
+            </a:extLst>
+          </a:blip>
+          <a:srcRect/>
+          <a:stretch>
+            <a:fillRect/>
+          </a:stretch>
+        </p:blipFill>
+        <p:spPr bwMode="auto">
+          <a:xfrm>
+            <a:off x="4572000" y="2546396"/>
+            <a:ext cx="4347576" cy="3043303"/>
+          </a:xfrm>
+          <a:prstGeom prst="rect">
+            <a:avLst/>
+          </a:prstGeom>
+          <a:noFill/>
+          <a:extLst>
+            <a:ext uri="{909E8E84-426E-40DD-AFC4-6F175D3DCCD1}">
+              <a14:hiddenFill xmlns:a14="http://schemas.microsoft.com/office/drawing/2010/main">
+                <a:solidFill>
+                  <a:srgbClr val="FFFFFF"/>
+                </a:solidFill>
+              </a14:hiddenFill>
+            </a:ext>
+          </a:extLst>
+        </p:spPr>
+      </p:pic>
+      <p:pic>
+        <p:nvPicPr>
+          <p:cNvPr id="3075" name="Picture 3" descr="C:\Users\Joshua Musick\workspace\Alg_Term_Project\data\analysis\stringsWav\Window Length_RMS Error.png"/>
+          <p:cNvPicPr>
+            <a:picLocks noChangeAspect="1" noChangeArrowheads="1"/>
+          </p:cNvPicPr>
+          <p:nvPr/>
+        </p:nvPicPr>
+        <p:blipFill>
+          <a:blip r:embed="rId3">
+            <a:extLst>
+              <a:ext uri="{28A0092B-C50C-407E-A947-70E740481C1C}">
+                <a14:useLocalDpi xmlns:a14="http://schemas.microsoft.com/office/drawing/2010/main" val="0"/>
+              </a:ext>
+            </a:extLst>
+          </a:blip>
+          <a:srcRect/>
+          <a:stretch>
+            <a:fillRect/>
+          </a:stretch>
+        </p:blipFill>
+        <p:spPr bwMode="auto">
+          <a:xfrm>
+            <a:off x="304800" y="2590800"/>
+            <a:ext cx="4220709" cy="2954496"/>
+          </a:xfrm>
+          <a:prstGeom prst="rect">
+            <a:avLst/>
+          </a:prstGeom>
+          <a:noFill/>
+          <a:extLst>
+            <a:ext uri="{909E8E84-426E-40DD-AFC4-6F175D3DCCD1}">
+              <a14:hiddenFill xmlns:a14="http://schemas.microsoft.com/office/drawing/2010/main">
+                <a:solidFill>
+                  <a:srgbClr val="FFFFFF"/>
+                </a:solidFill>
+              </a14:hiddenFill>
+            </a:ext>
+          </a:extLst>
+        </p:spPr>
+      </p:pic>
+      <p:pic>
+        <p:nvPicPr>
+          <p:cNvPr id="7" name="Content Placeholder 5"/>
+          <p:cNvPicPr>
+            <a:picLocks noChangeAspect="1"/>
+          </p:cNvPicPr>
+          <p:nvPr/>
+        </p:nvPicPr>
+        <p:blipFill>
+          <a:blip r:embed="rId4">
+            <a:extLst>
+              <a:ext uri="{28A0092B-C50C-407E-A947-70E740481C1C}">
+                <a14:useLocalDpi xmlns:a14="http://schemas.microsoft.com/office/drawing/2010/main" val="0"/>
+              </a:ext>
+            </a:extLst>
+          </a:blip>
+          <a:stretch>
+            <a:fillRect/>
+          </a:stretch>
+        </p:blipFill>
+        <p:spPr>
+          <a:xfrm>
+            <a:off x="4644030" y="162988"/>
+            <a:ext cx="4426330" cy="2383408"/>
+          </a:xfrm>
+          <a:prstGeom prst="rect">
+            <a:avLst/>
+          </a:prstGeom>
+        </p:spPr>
+      </p:pic>
+    </p:spTree>
+    <p:extLst>
+      <p:ext uri="{BB962C8B-B14F-4D97-AF65-F5344CB8AC3E}">
+        <p14:creationId xmlns:p14="http://schemas.microsoft.com/office/powerpoint/2010/main" val="1426029419"/>
+      </p:ext>
+    </p:extLst>
+  </p:cSld>
+  <p:clrMapOvr>
+    <a:masterClrMapping/>
+  </p:clrMapOvr>
+</p:sld>
+</file>
+
+<file path=ppt/slides/slide8.xml><?xml version="1.0" encoding="utf-8"?>
 <p:sld xmlns:a="http://schemas.openxmlformats.org/drawingml/2006/main" xmlns:r="http://schemas.openxmlformats.org/officeDocument/2006/relationships" xmlns:p="http://schemas.openxmlformats.org/presentationml/2006/main">
   <p:cSld>
     <p:spTree>
@@ -6896,7 +7240,7 @@
                       <m:dPr>
                         <m:ctrlPr>
                           <a:rPr lang="en-US" i="1">
-                            <a:latin typeface="Cambria Math" panose="02040503050406030204" pitchFamily="18" charset="0"/>
+                            <a:latin typeface="Cambria Math"/>
                           </a:rPr>
                         </m:ctrlPr>
                       </m:dPr>
@@ -6905,7 +7249,7 @@
                           <m:sSupPr>
                             <m:ctrlPr>
                               <a:rPr lang="en-US" b="0" i="1" smtClean="0">
-                                <a:latin typeface="Cambria Math" panose="02040503050406030204" pitchFamily="18" charset="0"/>
+                                <a:latin typeface="Cambria Math"/>
                               </a:rPr>
                             </m:ctrlPr>
                           </m:sSupPr>
@@ -6955,7 +7299,7 @@
                       <m:dPr>
                         <m:ctrlPr>
                           <a:rPr lang="en-US" i="1">
-                            <a:latin typeface="Cambria Math" panose="02040503050406030204" pitchFamily="18" charset="0"/>
+                            <a:latin typeface="Cambria Math"/>
                           </a:rPr>
                         </m:ctrlPr>
                       </m:dPr>
@@ -7047,7 +7391,7 @@
     </p:spTree>
     <p:extLst>
       <p:ext uri="{BB962C8B-B14F-4D97-AF65-F5344CB8AC3E}">
-        <p14:creationId xmlns:p14="http://schemas.microsoft.com/office/powerpoint/2010/main" val="683678322"/>
+        <p14:creationId xmlns:p14="http://schemas.microsoft.com/office/powerpoint/2010/main" val="2838646972"/>
       </p:ext>
     </p:extLst>
   </p:cSld>
@@ -7057,7 +7401,7 @@
 </p:sld>
 </file>
 
-<file path=ppt/slides/slide6.xml><?xml version="1.0" encoding="utf-8"?>
+<file path=ppt/slides/slide9.xml><?xml version="1.0" encoding="utf-8"?>
 <p:sld xmlns:a="http://schemas.openxmlformats.org/drawingml/2006/main" xmlns:r="http://schemas.openxmlformats.org/officeDocument/2006/relationships" xmlns:p="http://schemas.openxmlformats.org/presentationml/2006/main">
   <p:cSld>
     <p:spTree>
@@ -7274,301 +7618,7 @@
     </p:spTree>
     <p:extLst>
       <p:ext uri="{BB962C8B-B14F-4D97-AF65-F5344CB8AC3E}">
-        <p14:creationId xmlns:p14="http://schemas.microsoft.com/office/powerpoint/2010/main" val="1277048495"/>
-      </p:ext>
-    </p:extLst>
-  </p:cSld>
-  <p:clrMapOvr>
-    <a:masterClrMapping/>
-  </p:clrMapOvr>
-</p:sld>
-</file>
-
-<file path=ppt/slides/slide7.xml><?xml version="1.0" encoding="utf-8"?>
-<p:sld xmlns:a="http://schemas.openxmlformats.org/drawingml/2006/main" xmlns:r="http://schemas.openxmlformats.org/officeDocument/2006/relationships" xmlns:p="http://schemas.openxmlformats.org/presentationml/2006/main">
-  <p:cSld>
-    <p:spTree>
-      <p:nvGrpSpPr>
-        <p:cNvPr id="1" name=""/>
-        <p:cNvGrpSpPr/>
-        <p:nvPr/>
-      </p:nvGrpSpPr>
-      <p:grpSpPr>
-        <a:xfrm>
-          <a:off x="0" y="0"/>
-          <a:ext cx="0" cy="0"/>
-          <a:chOff x="0" y="0"/>
-          <a:chExt cx="0" cy="0"/>
-        </a:xfrm>
-      </p:grpSpPr>
-      <p:sp>
-        <p:nvSpPr>
-          <p:cNvPr id="2" name="Content Placeholder 1"/>
-          <p:cNvSpPr>
-            <a:spLocks noGrp="1"/>
-          </p:cNvSpPr>
-          <p:nvPr>
-            <p:ph idx="1"/>
-          </p:nvPr>
-        </p:nvSpPr>
-        <p:spPr/>
-        <p:txBody>
-          <a:bodyPr/>
-          <a:lstStyle/>
-          <a:p>
-            <a:endParaRPr lang="en-US"/>
-          </a:p>
-        </p:txBody>
-      </p:sp>
-      <p:sp>
-        <p:nvSpPr>
-          <p:cNvPr id="3" name="Title 2"/>
-          <p:cNvSpPr>
-            <a:spLocks noGrp="1"/>
-          </p:cNvSpPr>
-          <p:nvPr>
-            <p:ph type="title"/>
-          </p:nvPr>
-        </p:nvSpPr>
-        <p:spPr/>
-        <p:txBody>
-          <a:bodyPr/>
-          <a:lstStyle/>
-          <a:p>
-            <a:r>
-              <a:rPr lang="en-US" dirty="0" smtClean="0"/>
-              <a:t>Huffman Encoder</a:t>
-            </a:r>
-            <a:endParaRPr lang="en-US" dirty="0"/>
-          </a:p>
-        </p:txBody>
-      </p:sp>
-    </p:spTree>
-    <p:extLst>
-      <p:ext uri="{BB962C8B-B14F-4D97-AF65-F5344CB8AC3E}">
-        <p14:creationId xmlns:p14="http://schemas.microsoft.com/office/powerpoint/2010/main" val="1424251591"/>
-      </p:ext>
-    </p:extLst>
-  </p:cSld>
-  <p:clrMapOvr>
-    <a:masterClrMapping/>
-  </p:clrMapOvr>
-</p:sld>
-</file>
-
-<file path=ppt/slides/slide8.xml><?xml version="1.0" encoding="utf-8"?>
-<p:sld xmlns:a="http://schemas.openxmlformats.org/drawingml/2006/main" xmlns:r="http://schemas.openxmlformats.org/officeDocument/2006/relationships" xmlns:p="http://schemas.openxmlformats.org/presentationml/2006/main">
-  <p:cSld>
-    <p:spTree>
-      <p:nvGrpSpPr>
-        <p:cNvPr id="1" name=""/>
-        <p:cNvGrpSpPr/>
-        <p:nvPr/>
-      </p:nvGrpSpPr>
-      <p:grpSpPr>
-        <a:xfrm>
-          <a:off x="0" y="0"/>
-          <a:ext cx="0" cy="0"/>
-          <a:chOff x="0" y="0"/>
-          <a:chExt cx="0" cy="0"/>
-        </a:xfrm>
-      </p:grpSpPr>
-      <p:sp>
-        <p:nvSpPr>
-          <p:cNvPr id="2" name="Content Placeholder 1"/>
-          <p:cNvSpPr>
-            <a:spLocks noGrp="1"/>
-          </p:cNvSpPr>
-          <p:nvPr>
-            <p:ph idx="1"/>
-          </p:nvPr>
-        </p:nvSpPr>
-        <p:spPr/>
-        <p:txBody>
-          <a:bodyPr/>
-          <a:lstStyle/>
-          <a:p>
-            <a:endParaRPr lang="en-US"/>
-          </a:p>
-        </p:txBody>
-      </p:sp>
-      <p:sp>
-        <p:nvSpPr>
-          <p:cNvPr id="3" name="Title 2"/>
-          <p:cNvSpPr>
-            <a:spLocks noGrp="1"/>
-          </p:cNvSpPr>
-          <p:nvPr>
-            <p:ph type="title"/>
-          </p:nvPr>
-        </p:nvSpPr>
-        <p:spPr/>
-        <p:txBody>
-          <a:bodyPr/>
-          <a:lstStyle/>
-          <a:p>
-            <a:r>
-              <a:rPr lang="en-US" dirty="0" smtClean="0"/>
-              <a:t>Data Serialization</a:t>
-            </a:r>
-            <a:endParaRPr lang="en-US" dirty="0"/>
-          </a:p>
-        </p:txBody>
-      </p:sp>
-    </p:spTree>
-    <p:extLst>
-      <p:ext uri="{BB962C8B-B14F-4D97-AF65-F5344CB8AC3E}">
-        <p14:creationId xmlns:p14="http://schemas.microsoft.com/office/powerpoint/2010/main" val="2879479575"/>
-      </p:ext>
-    </p:extLst>
-  </p:cSld>
-  <p:clrMapOvr>
-    <a:masterClrMapping/>
-  </p:clrMapOvr>
-</p:sld>
-</file>
-
-<file path=ppt/slides/slide9.xml><?xml version="1.0" encoding="utf-8"?>
-<p:sld xmlns:a="http://schemas.openxmlformats.org/drawingml/2006/main" xmlns:r="http://schemas.openxmlformats.org/officeDocument/2006/relationships" xmlns:p="http://schemas.openxmlformats.org/presentationml/2006/main">
-  <p:cSld>
-    <p:spTree>
-      <p:nvGrpSpPr>
-        <p:cNvPr id="1" name=""/>
-        <p:cNvGrpSpPr/>
-        <p:nvPr/>
-      </p:nvGrpSpPr>
-      <p:grpSpPr>
-        <a:xfrm>
-          <a:off x="0" y="0"/>
-          <a:ext cx="0" cy="0"/>
-          <a:chOff x="0" y="0"/>
-          <a:chExt cx="0" cy="0"/>
-        </a:xfrm>
-      </p:grpSpPr>
-      <p:sp>
-        <p:nvSpPr>
-          <p:cNvPr id="2" name="Content Placeholder 1"/>
-          <p:cNvSpPr>
-            <a:spLocks noGrp="1"/>
-          </p:cNvSpPr>
-          <p:nvPr>
-            <p:ph idx="1"/>
-          </p:nvPr>
-        </p:nvSpPr>
-        <p:spPr/>
-        <p:txBody>
-          <a:bodyPr/>
-          <a:lstStyle/>
-          <a:p>
-            <a:r>
-              <a:rPr lang="en-US" dirty="0" smtClean="0"/>
-              <a:t>We ran our compressor on nine wav files</a:t>
-            </a:r>
-          </a:p>
-          <a:p>
-            <a:pPr lvl="1"/>
-            <a:r>
-              <a:rPr lang="en-US" dirty="0" smtClean="0"/>
-              <a:t>2500 tests per file!</a:t>
-            </a:r>
-          </a:p>
-          <a:p>
-            <a:endParaRPr lang="en-US" dirty="0" smtClean="0"/>
-          </a:p>
-          <a:p>
-            <a:r>
-              <a:rPr lang="en-US" dirty="0" smtClean="0"/>
-              <a:t>Adjustable parameters:</a:t>
-            </a:r>
-          </a:p>
-          <a:p>
-            <a:pPr lvl="1"/>
-            <a:r>
-              <a:rPr lang="en-US" dirty="0" smtClean="0"/>
-              <a:t>Raw audio signal window length</a:t>
-            </a:r>
-          </a:p>
-          <a:p>
-            <a:pPr lvl="1"/>
-            <a:r>
-              <a:rPr lang="en-US" dirty="0" err="1" smtClean="0"/>
-              <a:t>Filterbank</a:t>
-            </a:r>
-            <a:r>
-              <a:rPr lang="en-US" dirty="0" smtClean="0"/>
-              <a:t> prototype filter</a:t>
-            </a:r>
-          </a:p>
-          <a:p>
-            <a:pPr lvl="1"/>
-            <a:r>
-              <a:rPr lang="en-US" dirty="0" err="1" smtClean="0"/>
-              <a:t>Filterbank</a:t>
-            </a:r>
-            <a:r>
-              <a:rPr lang="en-US" dirty="0" smtClean="0"/>
-              <a:t> filter length</a:t>
-            </a:r>
-          </a:p>
-          <a:p>
-            <a:pPr lvl="1"/>
-            <a:r>
-              <a:rPr lang="en-US" dirty="0" smtClean="0"/>
-              <a:t>Psycho-acoustic model passband frequencies</a:t>
-            </a:r>
-          </a:p>
-          <a:p>
-            <a:pPr lvl="1"/>
-            <a:r>
-              <a:rPr lang="en-US" dirty="0" smtClean="0"/>
-              <a:t>Use adaptive byte </a:t>
-            </a:r>
-            <a:r>
-              <a:rPr lang="en-US" dirty="0" err="1" smtClean="0"/>
-              <a:t>bufferizers</a:t>
-            </a:r>
-            <a:r>
-              <a:rPr lang="en-US" dirty="0" smtClean="0"/>
-              <a:t>?</a:t>
-            </a:r>
-          </a:p>
-          <a:p>
-            <a:pPr lvl="1"/>
-            <a:r>
-              <a:rPr lang="en-US" dirty="0" smtClean="0"/>
-              <a:t>Use adaptive Huffman Encoding?</a:t>
-            </a:r>
-            <a:endParaRPr lang="en-US" dirty="0"/>
-          </a:p>
-        </p:txBody>
-      </p:sp>
-      <p:sp>
-        <p:nvSpPr>
-          <p:cNvPr id="3" name="Title 2"/>
-          <p:cNvSpPr>
-            <a:spLocks noGrp="1"/>
-          </p:cNvSpPr>
-          <p:nvPr>
-            <p:ph type="title"/>
-          </p:nvPr>
-        </p:nvSpPr>
-        <p:spPr/>
-        <p:txBody>
-          <a:bodyPr/>
-          <a:lstStyle/>
-          <a:p>
-            <a:r>
-              <a:rPr lang="en-US" dirty="0" smtClean="0"/>
-              <a:t>Results - Variables</a:t>
-            </a:r>
-            <a:endParaRPr lang="en-US" dirty="0"/>
-          </a:p>
-        </p:txBody>
-      </p:sp>
-    </p:spTree>
-    <p:extLst>
-      <p:ext uri="{BB962C8B-B14F-4D97-AF65-F5344CB8AC3E}">
-        <p14:creationId xmlns:p14="http://schemas.microsoft.com/office/powerpoint/2010/main" val="2419074876"/>
+        <p14:creationId xmlns:p14="http://schemas.microsoft.com/office/powerpoint/2010/main" val="974130416"/>
       </p:ext>
     </p:extLst>
   </p:cSld>

</xml_diff>